<commit_message>
Fall2016 - submitted last of reports, finished presentations, deliverables all delivered
</commit_message>
<xml_diff>
--- a/CISC874/Project/PartC/DataPipeline.pptx
+++ b/CISC874/Project/PartC/DataPipeline.pptx
@@ -248,7 +248,7 @@
           <a:p>
             <a:fld id="{8A73721D-0424-4701-9427-6A60784BC223}" type="datetimeFigureOut">
               <a:rPr lang="en-CA" smtClean="0"/>
-              <a:t>13/11/2016</a:t>
+              <a:t>03/12/2016</a:t>
             </a:fld>
             <a:endParaRPr lang="en-CA"/>
           </a:p>
@@ -418,7 +418,7 @@
           <a:p>
             <a:fld id="{8A73721D-0424-4701-9427-6A60784BC223}" type="datetimeFigureOut">
               <a:rPr lang="en-CA" smtClean="0"/>
-              <a:t>13/11/2016</a:t>
+              <a:t>03/12/2016</a:t>
             </a:fld>
             <a:endParaRPr lang="en-CA"/>
           </a:p>
@@ -598,7 +598,7 @@
           <a:p>
             <a:fld id="{8A73721D-0424-4701-9427-6A60784BC223}" type="datetimeFigureOut">
               <a:rPr lang="en-CA" smtClean="0"/>
-              <a:t>13/11/2016</a:t>
+              <a:t>03/12/2016</a:t>
             </a:fld>
             <a:endParaRPr lang="en-CA"/>
           </a:p>
@@ -768,7 +768,7 @@
           <a:p>
             <a:fld id="{8A73721D-0424-4701-9427-6A60784BC223}" type="datetimeFigureOut">
               <a:rPr lang="en-CA" smtClean="0"/>
-              <a:t>13/11/2016</a:t>
+              <a:t>03/12/2016</a:t>
             </a:fld>
             <a:endParaRPr lang="en-CA"/>
           </a:p>
@@ -1014,7 +1014,7 @@
           <a:p>
             <a:fld id="{8A73721D-0424-4701-9427-6A60784BC223}" type="datetimeFigureOut">
               <a:rPr lang="en-CA" smtClean="0"/>
-              <a:t>13/11/2016</a:t>
+              <a:t>03/12/2016</a:t>
             </a:fld>
             <a:endParaRPr lang="en-CA"/>
           </a:p>
@@ -1246,7 +1246,7 @@
           <a:p>
             <a:fld id="{8A73721D-0424-4701-9427-6A60784BC223}" type="datetimeFigureOut">
               <a:rPr lang="en-CA" smtClean="0"/>
-              <a:t>13/11/2016</a:t>
+              <a:t>03/12/2016</a:t>
             </a:fld>
             <a:endParaRPr lang="en-CA"/>
           </a:p>
@@ -1613,7 +1613,7 @@
           <a:p>
             <a:fld id="{8A73721D-0424-4701-9427-6A60784BC223}" type="datetimeFigureOut">
               <a:rPr lang="en-CA" smtClean="0"/>
-              <a:t>13/11/2016</a:t>
+              <a:t>03/12/2016</a:t>
             </a:fld>
             <a:endParaRPr lang="en-CA"/>
           </a:p>
@@ -1731,7 +1731,7 @@
           <a:p>
             <a:fld id="{8A73721D-0424-4701-9427-6A60784BC223}" type="datetimeFigureOut">
               <a:rPr lang="en-CA" smtClean="0"/>
-              <a:t>13/11/2016</a:t>
+              <a:t>03/12/2016</a:t>
             </a:fld>
             <a:endParaRPr lang="en-CA"/>
           </a:p>
@@ -1826,7 +1826,7 @@
           <a:p>
             <a:fld id="{8A73721D-0424-4701-9427-6A60784BC223}" type="datetimeFigureOut">
               <a:rPr lang="en-CA" smtClean="0"/>
-              <a:t>13/11/2016</a:t>
+              <a:t>03/12/2016</a:t>
             </a:fld>
             <a:endParaRPr lang="en-CA"/>
           </a:p>
@@ -2103,7 +2103,7 @@
           <a:p>
             <a:fld id="{8A73721D-0424-4701-9427-6A60784BC223}" type="datetimeFigureOut">
               <a:rPr lang="en-CA" smtClean="0"/>
-              <a:t>13/11/2016</a:t>
+              <a:t>03/12/2016</a:t>
             </a:fld>
             <a:endParaRPr lang="en-CA"/>
           </a:p>
@@ -2356,7 +2356,7 @@
           <a:p>
             <a:fld id="{8A73721D-0424-4701-9427-6A60784BC223}" type="datetimeFigureOut">
               <a:rPr lang="en-CA" smtClean="0"/>
-              <a:t>13/11/2016</a:t>
+              <a:t>03/12/2016</a:t>
             </a:fld>
             <a:endParaRPr lang="en-CA"/>
           </a:p>
@@ -2569,7 +2569,7 @@
           <a:p>
             <a:fld id="{8A73721D-0424-4701-9427-6A60784BC223}" type="datetimeFigureOut">
               <a:rPr lang="en-CA" smtClean="0"/>
-              <a:t>13/11/2016</a:t>
+              <a:t>03/12/2016</a:t>
             </a:fld>
             <a:endParaRPr lang="en-CA"/>
           </a:p>
@@ -11274,7 +11274,7 @@
       </p:grpSpPr>
       <p:grpSp>
         <p:nvGrpSpPr>
-          <p:cNvPr id="85" name="Group 84"/>
+          <p:cNvPr id="46" name="Group 45"/>
           <p:cNvGrpSpPr/>
           <p:nvPr/>
         </p:nvGrpSpPr>
@@ -11286,2027 +11286,2265 @@
             <a:chExt cx="11290946" cy="5408023"/>
           </a:xfrm>
         </p:grpSpPr>
-        <p:sp>
-          <p:nvSpPr>
-            <p:cNvPr id="2" name="Rectangle 1"/>
-            <p:cNvSpPr/>
-            <p:nvPr/>
-          </p:nvSpPr>
-          <p:spPr>
-            <a:xfrm>
-              <a:off x="1861459" y="705394"/>
-              <a:ext cx="8092438" cy="5408023"/>
-            </a:xfrm>
-            <a:prstGeom prst="rect">
-              <a:avLst/>
-            </a:prstGeom>
-            <a:noFill/>
-            <a:ln w="57150">
-              <a:solidFill>
-                <a:schemeClr val="tx1"/>
-              </a:solidFill>
-            </a:ln>
-          </p:spPr>
-          <p:style>
-            <a:lnRef idx="2">
-              <a:schemeClr val="accent1">
-                <a:shade val="50000"/>
-              </a:schemeClr>
-            </a:lnRef>
-            <a:fillRef idx="1">
-              <a:schemeClr val="accent1"/>
-            </a:fillRef>
-            <a:effectRef idx="0">
-              <a:schemeClr val="accent1"/>
-            </a:effectRef>
-            <a:fontRef idx="minor">
-              <a:schemeClr val="lt1"/>
-            </a:fontRef>
-          </p:style>
-          <p:txBody>
-            <a:bodyPr rtlCol="0" anchor="ctr"/>
-            <a:lstStyle/>
-            <a:p>
-              <a:pPr algn="ctr"/>
-              <a:endParaRPr lang="en-CA"/>
-            </a:p>
-          </p:txBody>
-        </p:sp>
-        <p:sp>
-          <p:nvSpPr>
-            <p:cNvPr id="3" name="TextBox 2"/>
-            <p:cNvSpPr txBox="1"/>
-            <p:nvPr/>
-          </p:nvSpPr>
-          <p:spPr>
-            <a:xfrm>
-              <a:off x="4258490" y="705394"/>
-              <a:ext cx="3169921" cy="646331"/>
-            </a:xfrm>
-            <a:prstGeom prst="rect">
-              <a:avLst/>
-            </a:prstGeom>
-            <a:noFill/>
-          </p:spPr>
-          <p:txBody>
-            <a:bodyPr wrap="square" rtlCol="0">
-              <a:spAutoFit/>
-            </a:bodyPr>
-            <a:lstStyle/>
-            <a:p>
-              <a:r>
-                <a:rPr lang="en-CA" sz="3600" dirty="0" smtClean="0"/>
-                <a:t>Neural network</a:t>
-              </a:r>
-              <a:endParaRPr lang="en-CA" sz="3600" dirty="0"/>
-            </a:p>
-          </p:txBody>
-        </p:sp>
-        <p:sp>
-          <p:nvSpPr>
-            <p:cNvPr id="4" name="Right Arrow 3"/>
-            <p:cNvSpPr/>
-            <p:nvPr/>
-          </p:nvSpPr>
-          <p:spPr>
-            <a:xfrm>
-              <a:off x="278674" y="3033811"/>
-              <a:ext cx="1582785" cy="583474"/>
-            </a:xfrm>
-            <a:prstGeom prst="rightArrow">
-              <a:avLst/>
-            </a:prstGeom>
-            <a:solidFill>
-              <a:schemeClr val="tx1"/>
-            </a:solidFill>
-            <a:ln>
-              <a:solidFill>
-                <a:schemeClr val="tx1"/>
-              </a:solidFill>
-            </a:ln>
-          </p:spPr>
-          <p:style>
-            <a:lnRef idx="2">
-              <a:schemeClr val="accent1">
-                <a:shade val="50000"/>
-              </a:schemeClr>
-            </a:lnRef>
-            <a:fillRef idx="1">
-              <a:schemeClr val="accent1"/>
-            </a:fillRef>
-            <a:effectRef idx="0">
-              <a:schemeClr val="accent1"/>
-            </a:effectRef>
-            <a:fontRef idx="minor">
-              <a:schemeClr val="lt1"/>
-            </a:fontRef>
-          </p:style>
-          <p:txBody>
-            <a:bodyPr rtlCol="0" anchor="ctr"/>
-            <a:lstStyle/>
-            <a:p>
-              <a:pPr algn="ctr"/>
-              <a:endParaRPr lang="en-CA"/>
-            </a:p>
-          </p:txBody>
-        </p:sp>
-        <p:sp>
-          <p:nvSpPr>
-            <p:cNvPr id="5" name="TextBox 4"/>
-            <p:cNvSpPr txBox="1"/>
-            <p:nvPr/>
-          </p:nvSpPr>
-          <p:spPr>
-            <a:xfrm>
-              <a:off x="89260" y="1994258"/>
-              <a:ext cx="2140134" cy="1200329"/>
-            </a:xfrm>
-            <a:prstGeom prst="rect">
-              <a:avLst/>
-            </a:prstGeom>
-            <a:noFill/>
-          </p:spPr>
-          <p:txBody>
-            <a:bodyPr wrap="square" rtlCol="0">
-              <a:spAutoFit/>
-            </a:bodyPr>
-            <a:lstStyle/>
-            <a:p>
-              <a:r>
-                <a:rPr lang="en-CA" sz="2400" dirty="0"/>
-                <a:t>Data suitable for neural network</a:t>
-              </a:r>
-              <a:endParaRPr lang="en-CA" sz="2400" dirty="0"/>
-            </a:p>
-          </p:txBody>
-        </p:sp>
         <p:grpSp>
           <p:nvGrpSpPr>
-            <p:cNvPr id="14" name="Group 13"/>
+            <p:cNvPr id="44" name="Group 43"/>
             <p:cNvGrpSpPr/>
             <p:nvPr/>
           </p:nvGrpSpPr>
           <p:grpSpPr>
             <a:xfrm>
-              <a:off x="3100251" y="1994258"/>
-              <a:ext cx="635726" cy="3578101"/>
-              <a:chOff x="3100251" y="1994258"/>
-              <a:chExt cx="635726" cy="3578101"/>
+              <a:off x="89260" y="705394"/>
+              <a:ext cx="11290946" cy="5408023"/>
+              <a:chOff x="89260" y="705394"/>
+              <a:chExt cx="11290946" cy="5408023"/>
             </a:xfrm>
           </p:grpSpPr>
-          <p:sp>
-            <p:nvSpPr>
-              <p:cNvPr id="6" name="Oval 5"/>
-              <p:cNvSpPr/>
+          <p:grpSp>
+            <p:nvGrpSpPr>
+              <p:cNvPr id="85" name="Group 84"/>
+              <p:cNvGrpSpPr/>
               <p:nvPr/>
-            </p:nvSpPr>
-            <p:spPr>
+            </p:nvGrpSpPr>
+            <p:grpSpPr>
               <a:xfrm>
-                <a:off x="3100251" y="1994258"/>
-                <a:ext cx="635726" cy="609605"/>
+                <a:off x="89260" y="705394"/>
+                <a:ext cx="11290946" cy="5408023"/>
+                <a:chOff x="89260" y="705394"/>
+                <a:chExt cx="11290946" cy="5408023"/>
               </a:xfrm>
-              <a:prstGeom prst="ellipse">
-                <a:avLst/>
-              </a:prstGeom>
-              <a:noFill/>
-              <a:ln w="38100">
+            </p:grpSpPr>
+            <p:sp>
+              <p:nvSpPr>
+                <p:cNvPr id="2" name="Rectangle 1"/>
+                <p:cNvSpPr/>
+                <p:nvPr/>
+              </p:nvSpPr>
+              <p:spPr>
+                <a:xfrm>
+                  <a:off x="1861459" y="705394"/>
+                  <a:ext cx="8092438" cy="5408023"/>
+                </a:xfrm>
+                <a:prstGeom prst="rect">
+                  <a:avLst/>
+                </a:prstGeom>
+                <a:noFill/>
+                <a:ln w="57150">
+                  <a:solidFill>
+                    <a:schemeClr val="tx1"/>
+                  </a:solidFill>
+                </a:ln>
+              </p:spPr>
+              <p:style>
+                <a:lnRef idx="2">
+                  <a:schemeClr val="accent1">
+                    <a:shade val="50000"/>
+                  </a:schemeClr>
+                </a:lnRef>
+                <a:fillRef idx="1">
+                  <a:schemeClr val="accent1"/>
+                </a:fillRef>
+                <a:effectRef idx="0">
+                  <a:schemeClr val="accent1"/>
+                </a:effectRef>
+                <a:fontRef idx="minor">
+                  <a:schemeClr val="lt1"/>
+                </a:fontRef>
+              </p:style>
+              <p:txBody>
+                <a:bodyPr rtlCol="0" anchor="ctr"/>
+                <a:lstStyle/>
+                <a:p>
+                  <a:pPr algn="ctr"/>
+                  <a:endParaRPr lang="en-CA"/>
+                </a:p>
+              </p:txBody>
+            </p:sp>
+            <p:sp>
+              <p:nvSpPr>
+                <p:cNvPr id="3" name="TextBox 2"/>
+                <p:cNvSpPr txBox="1"/>
+                <p:nvPr/>
+              </p:nvSpPr>
+              <p:spPr>
+                <a:xfrm>
+                  <a:off x="4258490" y="705394"/>
+                  <a:ext cx="3169921" cy="646331"/>
+                </a:xfrm>
+                <a:prstGeom prst="rect">
+                  <a:avLst/>
+                </a:prstGeom>
+                <a:noFill/>
+              </p:spPr>
+              <p:txBody>
+                <a:bodyPr wrap="square" rtlCol="0">
+                  <a:spAutoFit/>
+                </a:bodyPr>
+                <a:lstStyle/>
+                <a:p>
+                  <a:r>
+                    <a:rPr lang="en-CA" sz="3600" dirty="0" smtClean="0"/>
+                    <a:t>Neural network</a:t>
+                  </a:r>
+                  <a:endParaRPr lang="en-CA" sz="3600" dirty="0"/>
+                </a:p>
+              </p:txBody>
+            </p:sp>
+            <p:sp>
+              <p:nvSpPr>
+                <p:cNvPr id="4" name="Right Arrow 3"/>
+                <p:cNvSpPr/>
+                <p:nvPr/>
+              </p:nvSpPr>
+              <p:spPr>
+                <a:xfrm>
+                  <a:off x="278674" y="3033811"/>
+                  <a:ext cx="1582785" cy="583474"/>
+                </a:xfrm>
+                <a:prstGeom prst="rightArrow">
+                  <a:avLst/>
+                </a:prstGeom>
                 <a:solidFill>
                   <a:schemeClr val="tx1"/>
                 </a:solidFill>
-              </a:ln>
-            </p:spPr>
-            <p:style>
-              <a:lnRef idx="2">
-                <a:schemeClr val="accent1">
-                  <a:shade val="50000"/>
-                </a:schemeClr>
-              </a:lnRef>
-              <a:fillRef idx="1">
-                <a:schemeClr val="accent1"/>
-              </a:fillRef>
-              <a:effectRef idx="0">
-                <a:schemeClr val="accent1"/>
-              </a:effectRef>
-              <a:fontRef idx="minor">
-                <a:schemeClr val="lt1"/>
-              </a:fontRef>
-            </p:style>
-            <p:txBody>
-              <a:bodyPr rtlCol="0" anchor="ctr"/>
-              <a:lstStyle/>
-              <a:p>
-                <a:pPr algn="ctr"/>
-                <a:endParaRPr lang="en-CA"/>
-              </a:p>
-            </p:txBody>
-          </p:sp>
-          <p:sp>
-            <p:nvSpPr>
-              <p:cNvPr id="7" name="Oval 6"/>
-              <p:cNvSpPr/>
-              <p:nvPr/>
-            </p:nvSpPr>
-            <p:spPr>
-              <a:xfrm>
-                <a:off x="3100251" y="2715943"/>
-                <a:ext cx="635726" cy="609605"/>
-              </a:xfrm>
-              <a:prstGeom prst="ellipse">
-                <a:avLst/>
-              </a:prstGeom>
-              <a:noFill/>
-              <a:ln w="38100">
+                <a:ln>
+                  <a:solidFill>
+                    <a:schemeClr val="tx1"/>
+                  </a:solidFill>
+                </a:ln>
+              </p:spPr>
+              <p:style>
+                <a:lnRef idx="2">
+                  <a:schemeClr val="accent1">
+                    <a:shade val="50000"/>
+                  </a:schemeClr>
+                </a:lnRef>
+                <a:fillRef idx="1">
+                  <a:schemeClr val="accent1"/>
+                </a:fillRef>
+                <a:effectRef idx="0">
+                  <a:schemeClr val="accent1"/>
+                </a:effectRef>
+                <a:fontRef idx="minor">
+                  <a:schemeClr val="lt1"/>
+                </a:fontRef>
+              </p:style>
+              <p:txBody>
+                <a:bodyPr rtlCol="0" anchor="ctr"/>
+                <a:lstStyle/>
+                <a:p>
+                  <a:pPr algn="ctr"/>
+                  <a:endParaRPr lang="en-CA"/>
+                </a:p>
+              </p:txBody>
+            </p:sp>
+            <p:sp>
+              <p:nvSpPr>
+                <p:cNvPr id="5" name="TextBox 4"/>
+                <p:cNvSpPr txBox="1"/>
+                <p:nvPr/>
+              </p:nvSpPr>
+              <p:spPr>
+                <a:xfrm>
+                  <a:off x="89260" y="1994258"/>
+                  <a:ext cx="2140134" cy="1200329"/>
+                </a:xfrm>
+                <a:prstGeom prst="rect">
+                  <a:avLst/>
+                </a:prstGeom>
+                <a:noFill/>
+              </p:spPr>
+              <p:txBody>
+                <a:bodyPr wrap="square" rtlCol="0">
+                  <a:spAutoFit/>
+                </a:bodyPr>
+                <a:lstStyle/>
+                <a:p>
+                  <a:r>
+                    <a:rPr lang="en-CA" sz="2400" dirty="0"/>
+                    <a:t>Data suitable for neural network</a:t>
+                  </a:r>
+                </a:p>
+              </p:txBody>
+            </p:sp>
+            <p:grpSp>
+              <p:nvGrpSpPr>
+                <p:cNvPr id="14" name="Group 13"/>
+                <p:cNvGrpSpPr/>
+                <p:nvPr/>
+              </p:nvGrpSpPr>
+              <p:grpSpPr>
+                <a:xfrm>
+                  <a:off x="3100251" y="1994258"/>
+                  <a:ext cx="635726" cy="3578101"/>
+                  <a:chOff x="3100251" y="1994258"/>
+                  <a:chExt cx="635726" cy="3578101"/>
+                </a:xfrm>
+              </p:grpSpPr>
+              <p:sp>
+                <p:nvSpPr>
+                  <p:cNvPr id="6" name="Oval 5"/>
+                  <p:cNvSpPr/>
+                  <p:nvPr/>
+                </p:nvSpPr>
+                <p:spPr>
+                  <a:xfrm>
+                    <a:off x="3100251" y="1994258"/>
+                    <a:ext cx="635726" cy="609605"/>
+                  </a:xfrm>
+                  <a:prstGeom prst="ellipse">
+                    <a:avLst/>
+                  </a:prstGeom>
+                  <a:noFill/>
+                  <a:ln w="38100">
+                    <a:solidFill>
+                      <a:schemeClr val="tx1"/>
+                    </a:solidFill>
+                  </a:ln>
+                </p:spPr>
+                <p:style>
+                  <a:lnRef idx="2">
+                    <a:schemeClr val="accent1">
+                      <a:shade val="50000"/>
+                    </a:schemeClr>
+                  </a:lnRef>
+                  <a:fillRef idx="1">
+                    <a:schemeClr val="accent1"/>
+                  </a:fillRef>
+                  <a:effectRef idx="0">
+                    <a:schemeClr val="accent1"/>
+                  </a:effectRef>
+                  <a:fontRef idx="minor">
+                    <a:schemeClr val="lt1"/>
+                  </a:fontRef>
+                </p:style>
+                <p:txBody>
+                  <a:bodyPr rtlCol="0" anchor="ctr"/>
+                  <a:lstStyle/>
+                  <a:p>
+                    <a:pPr algn="ctr"/>
+                    <a:endParaRPr lang="en-CA"/>
+                  </a:p>
+                </p:txBody>
+              </p:sp>
+              <p:sp>
+                <p:nvSpPr>
+                  <p:cNvPr id="7" name="Oval 6"/>
+                  <p:cNvSpPr/>
+                  <p:nvPr/>
+                </p:nvSpPr>
+                <p:spPr>
+                  <a:xfrm>
+                    <a:off x="3100251" y="2715943"/>
+                    <a:ext cx="635726" cy="609605"/>
+                  </a:xfrm>
+                  <a:prstGeom prst="ellipse">
+                    <a:avLst/>
+                  </a:prstGeom>
+                  <a:noFill/>
+                  <a:ln w="38100">
+                    <a:solidFill>
+                      <a:schemeClr val="tx1"/>
+                    </a:solidFill>
+                  </a:ln>
+                </p:spPr>
+                <p:style>
+                  <a:lnRef idx="2">
+                    <a:schemeClr val="accent1">
+                      <a:shade val="50000"/>
+                    </a:schemeClr>
+                  </a:lnRef>
+                  <a:fillRef idx="1">
+                    <a:schemeClr val="accent1"/>
+                  </a:fillRef>
+                  <a:effectRef idx="0">
+                    <a:schemeClr val="accent1"/>
+                  </a:effectRef>
+                  <a:fontRef idx="minor">
+                    <a:schemeClr val="lt1"/>
+                  </a:fontRef>
+                </p:style>
+                <p:txBody>
+                  <a:bodyPr rtlCol="0" anchor="ctr"/>
+                  <a:lstStyle/>
+                  <a:p>
+                    <a:pPr algn="ctr"/>
+                    <a:endParaRPr lang="en-CA"/>
+                  </a:p>
+                </p:txBody>
+              </p:sp>
+              <p:sp>
+                <p:nvSpPr>
+                  <p:cNvPr id="8" name="Oval 7"/>
+                  <p:cNvSpPr/>
+                  <p:nvPr/>
+                </p:nvSpPr>
+                <p:spPr>
+                  <a:xfrm>
+                    <a:off x="3100251" y="4183337"/>
+                    <a:ext cx="635726" cy="609605"/>
+                  </a:xfrm>
+                  <a:prstGeom prst="ellipse">
+                    <a:avLst/>
+                  </a:prstGeom>
+                  <a:noFill/>
+                  <a:ln w="38100">
+                    <a:solidFill>
+                      <a:schemeClr val="tx1"/>
+                    </a:solidFill>
+                  </a:ln>
+                </p:spPr>
+                <p:style>
+                  <a:lnRef idx="2">
+                    <a:schemeClr val="accent1">
+                      <a:shade val="50000"/>
+                    </a:schemeClr>
+                  </a:lnRef>
+                  <a:fillRef idx="1">
+                    <a:schemeClr val="accent1"/>
+                  </a:fillRef>
+                  <a:effectRef idx="0">
+                    <a:schemeClr val="accent1"/>
+                  </a:effectRef>
+                  <a:fontRef idx="minor">
+                    <a:schemeClr val="lt1"/>
+                  </a:fontRef>
+                </p:style>
+                <p:txBody>
+                  <a:bodyPr rtlCol="0" anchor="ctr"/>
+                  <a:lstStyle/>
+                  <a:p>
+                    <a:pPr algn="ctr"/>
+                    <a:endParaRPr lang="en-CA"/>
+                  </a:p>
+                </p:txBody>
+              </p:sp>
+              <p:sp>
+                <p:nvSpPr>
+                  <p:cNvPr id="9" name="Oval 8"/>
+                  <p:cNvSpPr/>
+                  <p:nvPr/>
+                </p:nvSpPr>
+                <p:spPr>
+                  <a:xfrm>
+                    <a:off x="3100251" y="4962754"/>
+                    <a:ext cx="635726" cy="609605"/>
+                  </a:xfrm>
+                  <a:prstGeom prst="ellipse">
+                    <a:avLst/>
+                  </a:prstGeom>
+                  <a:noFill/>
+                  <a:ln w="38100">
+                    <a:solidFill>
+                      <a:schemeClr val="tx1"/>
+                    </a:solidFill>
+                  </a:ln>
+                </p:spPr>
+                <p:style>
+                  <a:lnRef idx="2">
+                    <a:schemeClr val="accent1">
+                      <a:shade val="50000"/>
+                    </a:schemeClr>
+                  </a:lnRef>
+                  <a:fillRef idx="1">
+                    <a:schemeClr val="accent1"/>
+                  </a:fillRef>
+                  <a:effectRef idx="0">
+                    <a:schemeClr val="accent1"/>
+                  </a:effectRef>
+                  <a:fontRef idx="minor">
+                    <a:schemeClr val="lt1"/>
+                  </a:fontRef>
+                </p:style>
+                <p:txBody>
+                  <a:bodyPr rtlCol="0" anchor="ctr"/>
+                  <a:lstStyle/>
+                  <a:p>
+                    <a:pPr algn="ctr"/>
+                    <a:endParaRPr lang="en-CA"/>
+                  </a:p>
+                </p:txBody>
+              </p:sp>
+              <p:sp>
+                <p:nvSpPr>
+                  <p:cNvPr id="10" name="Oval 9"/>
+                  <p:cNvSpPr/>
+                  <p:nvPr/>
+                </p:nvSpPr>
+                <p:spPr>
+                  <a:xfrm>
+                    <a:off x="3371306" y="3476484"/>
+                    <a:ext cx="93616" cy="89985"/>
+                  </a:xfrm>
+                  <a:prstGeom prst="ellipse">
+                    <a:avLst/>
+                  </a:prstGeom>
+                  <a:solidFill>
+                    <a:schemeClr val="tx1"/>
+                  </a:solidFill>
+                  <a:ln w="38100">
+                    <a:solidFill>
+                      <a:schemeClr val="tx1"/>
+                    </a:solidFill>
+                  </a:ln>
+                </p:spPr>
+                <p:style>
+                  <a:lnRef idx="2">
+                    <a:schemeClr val="accent1">
+                      <a:shade val="50000"/>
+                    </a:schemeClr>
+                  </a:lnRef>
+                  <a:fillRef idx="1">
+                    <a:schemeClr val="accent1"/>
+                  </a:fillRef>
+                  <a:effectRef idx="0">
+                    <a:schemeClr val="accent1"/>
+                  </a:effectRef>
+                  <a:fontRef idx="minor">
+                    <a:schemeClr val="lt1"/>
+                  </a:fontRef>
+                </p:style>
+                <p:txBody>
+                  <a:bodyPr rtlCol="0" anchor="ctr"/>
+                  <a:lstStyle/>
+                  <a:p>
+                    <a:pPr algn="ctr"/>
+                    <a:endParaRPr lang="en-CA"/>
+                  </a:p>
+                </p:txBody>
+              </p:sp>
+              <p:sp>
+                <p:nvSpPr>
+                  <p:cNvPr id="11" name="Oval 10"/>
+                  <p:cNvSpPr/>
+                  <p:nvPr/>
+                </p:nvSpPr>
+                <p:spPr>
+                  <a:xfrm>
+                    <a:off x="3371306" y="3709450"/>
+                    <a:ext cx="93616" cy="89985"/>
+                  </a:xfrm>
+                  <a:prstGeom prst="ellipse">
+                    <a:avLst/>
+                  </a:prstGeom>
+                  <a:solidFill>
+                    <a:schemeClr val="tx1"/>
+                  </a:solidFill>
+                  <a:ln w="38100">
+                    <a:solidFill>
+                      <a:schemeClr val="tx1"/>
+                    </a:solidFill>
+                  </a:ln>
+                </p:spPr>
+                <p:style>
+                  <a:lnRef idx="2">
+                    <a:schemeClr val="accent1">
+                      <a:shade val="50000"/>
+                    </a:schemeClr>
+                  </a:lnRef>
+                  <a:fillRef idx="1">
+                    <a:schemeClr val="accent1"/>
+                  </a:fillRef>
+                  <a:effectRef idx="0">
+                    <a:schemeClr val="accent1"/>
+                  </a:effectRef>
+                  <a:fontRef idx="minor">
+                    <a:schemeClr val="lt1"/>
+                  </a:fontRef>
+                </p:style>
+                <p:txBody>
+                  <a:bodyPr rtlCol="0" anchor="ctr"/>
+                  <a:lstStyle/>
+                  <a:p>
+                    <a:pPr algn="ctr"/>
+                    <a:endParaRPr lang="en-CA"/>
+                  </a:p>
+                </p:txBody>
+              </p:sp>
+              <p:sp>
+                <p:nvSpPr>
+                  <p:cNvPr id="12" name="Oval 11"/>
+                  <p:cNvSpPr/>
+                  <p:nvPr/>
+                </p:nvSpPr>
+                <p:spPr>
+                  <a:xfrm>
+                    <a:off x="3371306" y="3932419"/>
+                    <a:ext cx="93616" cy="89985"/>
+                  </a:xfrm>
+                  <a:prstGeom prst="ellipse">
+                    <a:avLst/>
+                  </a:prstGeom>
+                  <a:solidFill>
+                    <a:schemeClr val="tx1"/>
+                  </a:solidFill>
+                  <a:ln w="38100">
+                    <a:solidFill>
+                      <a:schemeClr val="tx1"/>
+                    </a:solidFill>
+                  </a:ln>
+                </p:spPr>
+                <p:style>
+                  <a:lnRef idx="2">
+                    <a:schemeClr val="accent1">
+                      <a:shade val="50000"/>
+                    </a:schemeClr>
+                  </a:lnRef>
+                  <a:fillRef idx="1">
+                    <a:schemeClr val="accent1"/>
+                  </a:fillRef>
+                  <a:effectRef idx="0">
+                    <a:schemeClr val="accent1"/>
+                  </a:effectRef>
+                  <a:fontRef idx="minor">
+                    <a:schemeClr val="lt1"/>
+                  </a:fontRef>
+                </p:style>
+                <p:txBody>
+                  <a:bodyPr rtlCol="0" anchor="ctr"/>
+                  <a:lstStyle/>
+                  <a:p>
+                    <a:pPr algn="ctr"/>
+                    <a:endParaRPr lang="en-CA"/>
+                  </a:p>
+                </p:txBody>
+              </p:sp>
+            </p:grpSp>
+            <p:sp>
+              <p:nvSpPr>
+                <p:cNvPr id="13" name="TextBox 12"/>
+                <p:cNvSpPr txBox="1"/>
+                <p:nvPr/>
+              </p:nvSpPr>
+              <p:spPr>
+                <a:xfrm>
+                  <a:off x="2657203" y="1161014"/>
+                  <a:ext cx="1428206" cy="830997"/>
+                </a:xfrm>
+                <a:prstGeom prst="rect">
+                  <a:avLst/>
+                </a:prstGeom>
+                <a:noFill/>
+              </p:spPr>
+              <p:txBody>
+                <a:bodyPr wrap="square" rtlCol="0">
+                  <a:spAutoFit/>
+                </a:bodyPr>
+                <a:lstStyle/>
+                <a:p>
+                  <a:r>
+                    <a:rPr lang="en-CA" sz="2400" dirty="0" smtClean="0"/>
+                    <a:t>102 input nodes</a:t>
+                  </a:r>
+                  <a:endParaRPr lang="en-CA" sz="2400" dirty="0"/>
+                </a:p>
+              </p:txBody>
+            </p:sp>
+            <p:grpSp>
+              <p:nvGrpSpPr>
+                <p:cNvPr id="15" name="Group 14"/>
+                <p:cNvGrpSpPr/>
+                <p:nvPr/>
+              </p:nvGrpSpPr>
+              <p:grpSpPr>
+                <a:xfrm>
+                  <a:off x="5047707" y="1997471"/>
+                  <a:ext cx="635726" cy="3578101"/>
+                  <a:chOff x="3100251" y="1994258"/>
+                  <a:chExt cx="635726" cy="3578101"/>
+                </a:xfrm>
+              </p:grpSpPr>
+              <p:sp>
+                <p:nvSpPr>
+                  <p:cNvPr id="16" name="Oval 15"/>
+                  <p:cNvSpPr/>
+                  <p:nvPr/>
+                </p:nvSpPr>
+                <p:spPr>
+                  <a:xfrm>
+                    <a:off x="3100251" y="1994258"/>
+                    <a:ext cx="635726" cy="609605"/>
+                  </a:xfrm>
+                  <a:prstGeom prst="ellipse">
+                    <a:avLst/>
+                  </a:prstGeom>
+                  <a:noFill/>
+                  <a:ln w="38100">
+                    <a:solidFill>
+                      <a:schemeClr val="tx1"/>
+                    </a:solidFill>
+                  </a:ln>
+                </p:spPr>
+                <p:style>
+                  <a:lnRef idx="2">
+                    <a:schemeClr val="accent1">
+                      <a:shade val="50000"/>
+                    </a:schemeClr>
+                  </a:lnRef>
+                  <a:fillRef idx="1">
+                    <a:schemeClr val="accent1"/>
+                  </a:fillRef>
+                  <a:effectRef idx="0">
+                    <a:schemeClr val="accent1"/>
+                  </a:effectRef>
+                  <a:fontRef idx="minor">
+                    <a:schemeClr val="lt1"/>
+                  </a:fontRef>
+                </p:style>
+                <p:txBody>
+                  <a:bodyPr rtlCol="0" anchor="ctr"/>
+                  <a:lstStyle/>
+                  <a:p>
+                    <a:pPr algn="ctr"/>
+                    <a:endParaRPr lang="en-CA"/>
+                  </a:p>
+                </p:txBody>
+              </p:sp>
+              <p:sp>
+                <p:nvSpPr>
+                  <p:cNvPr id="17" name="Oval 16"/>
+                  <p:cNvSpPr/>
+                  <p:nvPr/>
+                </p:nvSpPr>
+                <p:spPr>
+                  <a:xfrm>
+                    <a:off x="3100251" y="2715943"/>
+                    <a:ext cx="635726" cy="609605"/>
+                  </a:xfrm>
+                  <a:prstGeom prst="ellipse">
+                    <a:avLst/>
+                  </a:prstGeom>
+                  <a:noFill/>
+                  <a:ln w="38100">
+                    <a:solidFill>
+                      <a:schemeClr val="tx1"/>
+                    </a:solidFill>
+                  </a:ln>
+                </p:spPr>
+                <p:style>
+                  <a:lnRef idx="2">
+                    <a:schemeClr val="accent1">
+                      <a:shade val="50000"/>
+                    </a:schemeClr>
+                  </a:lnRef>
+                  <a:fillRef idx="1">
+                    <a:schemeClr val="accent1"/>
+                  </a:fillRef>
+                  <a:effectRef idx="0">
+                    <a:schemeClr val="accent1"/>
+                  </a:effectRef>
+                  <a:fontRef idx="minor">
+                    <a:schemeClr val="lt1"/>
+                  </a:fontRef>
+                </p:style>
+                <p:txBody>
+                  <a:bodyPr rtlCol="0" anchor="ctr"/>
+                  <a:lstStyle/>
+                  <a:p>
+                    <a:pPr algn="ctr"/>
+                    <a:endParaRPr lang="en-CA"/>
+                  </a:p>
+                </p:txBody>
+              </p:sp>
+              <p:sp>
+                <p:nvSpPr>
+                  <p:cNvPr id="18" name="Oval 17"/>
+                  <p:cNvSpPr/>
+                  <p:nvPr/>
+                </p:nvSpPr>
+                <p:spPr>
+                  <a:xfrm>
+                    <a:off x="3100251" y="4183337"/>
+                    <a:ext cx="635726" cy="609605"/>
+                  </a:xfrm>
+                  <a:prstGeom prst="ellipse">
+                    <a:avLst/>
+                  </a:prstGeom>
+                  <a:noFill/>
+                  <a:ln w="38100">
+                    <a:solidFill>
+                      <a:schemeClr val="tx1"/>
+                    </a:solidFill>
+                  </a:ln>
+                </p:spPr>
+                <p:style>
+                  <a:lnRef idx="2">
+                    <a:schemeClr val="accent1">
+                      <a:shade val="50000"/>
+                    </a:schemeClr>
+                  </a:lnRef>
+                  <a:fillRef idx="1">
+                    <a:schemeClr val="accent1"/>
+                  </a:fillRef>
+                  <a:effectRef idx="0">
+                    <a:schemeClr val="accent1"/>
+                  </a:effectRef>
+                  <a:fontRef idx="minor">
+                    <a:schemeClr val="lt1"/>
+                  </a:fontRef>
+                </p:style>
+                <p:txBody>
+                  <a:bodyPr rtlCol="0" anchor="ctr"/>
+                  <a:lstStyle/>
+                  <a:p>
+                    <a:pPr algn="ctr"/>
+                    <a:endParaRPr lang="en-CA"/>
+                  </a:p>
+                </p:txBody>
+              </p:sp>
+              <p:sp>
+                <p:nvSpPr>
+                  <p:cNvPr id="19" name="Oval 18"/>
+                  <p:cNvSpPr/>
+                  <p:nvPr/>
+                </p:nvSpPr>
+                <p:spPr>
+                  <a:xfrm>
+                    <a:off x="3100251" y="4962754"/>
+                    <a:ext cx="635726" cy="609605"/>
+                  </a:xfrm>
+                  <a:prstGeom prst="ellipse">
+                    <a:avLst/>
+                  </a:prstGeom>
+                  <a:noFill/>
+                  <a:ln w="38100">
+                    <a:solidFill>
+                      <a:schemeClr val="tx1"/>
+                    </a:solidFill>
+                  </a:ln>
+                </p:spPr>
+                <p:style>
+                  <a:lnRef idx="2">
+                    <a:schemeClr val="accent1">
+                      <a:shade val="50000"/>
+                    </a:schemeClr>
+                  </a:lnRef>
+                  <a:fillRef idx="1">
+                    <a:schemeClr val="accent1"/>
+                  </a:fillRef>
+                  <a:effectRef idx="0">
+                    <a:schemeClr val="accent1"/>
+                  </a:effectRef>
+                  <a:fontRef idx="minor">
+                    <a:schemeClr val="lt1"/>
+                  </a:fontRef>
+                </p:style>
+                <p:txBody>
+                  <a:bodyPr rtlCol="0" anchor="ctr"/>
+                  <a:lstStyle/>
+                  <a:p>
+                    <a:pPr algn="ctr"/>
+                    <a:endParaRPr lang="en-CA"/>
+                  </a:p>
+                </p:txBody>
+              </p:sp>
+              <p:sp>
+                <p:nvSpPr>
+                  <p:cNvPr id="20" name="Oval 19"/>
+                  <p:cNvSpPr/>
+                  <p:nvPr/>
+                </p:nvSpPr>
+                <p:spPr>
+                  <a:xfrm>
+                    <a:off x="3371306" y="3476484"/>
+                    <a:ext cx="93616" cy="89985"/>
+                  </a:xfrm>
+                  <a:prstGeom prst="ellipse">
+                    <a:avLst/>
+                  </a:prstGeom>
+                  <a:solidFill>
+                    <a:schemeClr val="tx1"/>
+                  </a:solidFill>
+                  <a:ln w="38100">
+                    <a:solidFill>
+                      <a:schemeClr val="tx1"/>
+                    </a:solidFill>
+                  </a:ln>
+                </p:spPr>
+                <p:style>
+                  <a:lnRef idx="2">
+                    <a:schemeClr val="accent1">
+                      <a:shade val="50000"/>
+                    </a:schemeClr>
+                  </a:lnRef>
+                  <a:fillRef idx="1">
+                    <a:schemeClr val="accent1"/>
+                  </a:fillRef>
+                  <a:effectRef idx="0">
+                    <a:schemeClr val="accent1"/>
+                  </a:effectRef>
+                  <a:fontRef idx="minor">
+                    <a:schemeClr val="lt1"/>
+                  </a:fontRef>
+                </p:style>
+                <p:txBody>
+                  <a:bodyPr rtlCol="0" anchor="ctr"/>
+                  <a:lstStyle/>
+                  <a:p>
+                    <a:pPr algn="ctr"/>
+                    <a:endParaRPr lang="en-CA"/>
+                  </a:p>
+                </p:txBody>
+              </p:sp>
+              <p:sp>
+                <p:nvSpPr>
+                  <p:cNvPr id="21" name="Oval 20"/>
+                  <p:cNvSpPr/>
+                  <p:nvPr/>
+                </p:nvSpPr>
+                <p:spPr>
+                  <a:xfrm>
+                    <a:off x="3371306" y="3709450"/>
+                    <a:ext cx="93616" cy="89985"/>
+                  </a:xfrm>
+                  <a:prstGeom prst="ellipse">
+                    <a:avLst/>
+                  </a:prstGeom>
+                  <a:solidFill>
+                    <a:schemeClr val="tx1"/>
+                  </a:solidFill>
+                  <a:ln w="38100">
+                    <a:solidFill>
+                      <a:schemeClr val="tx1"/>
+                    </a:solidFill>
+                  </a:ln>
+                </p:spPr>
+                <p:style>
+                  <a:lnRef idx="2">
+                    <a:schemeClr val="accent1">
+                      <a:shade val="50000"/>
+                    </a:schemeClr>
+                  </a:lnRef>
+                  <a:fillRef idx="1">
+                    <a:schemeClr val="accent1"/>
+                  </a:fillRef>
+                  <a:effectRef idx="0">
+                    <a:schemeClr val="accent1"/>
+                  </a:effectRef>
+                  <a:fontRef idx="minor">
+                    <a:schemeClr val="lt1"/>
+                  </a:fontRef>
+                </p:style>
+                <p:txBody>
+                  <a:bodyPr rtlCol="0" anchor="ctr"/>
+                  <a:lstStyle/>
+                  <a:p>
+                    <a:pPr algn="ctr"/>
+                    <a:endParaRPr lang="en-CA"/>
+                  </a:p>
+                </p:txBody>
+              </p:sp>
+              <p:sp>
+                <p:nvSpPr>
+                  <p:cNvPr id="22" name="Oval 21"/>
+                  <p:cNvSpPr/>
+                  <p:nvPr/>
+                </p:nvSpPr>
+                <p:spPr>
+                  <a:xfrm>
+                    <a:off x="3371306" y="3932419"/>
+                    <a:ext cx="93616" cy="89985"/>
+                  </a:xfrm>
+                  <a:prstGeom prst="ellipse">
+                    <a:avLst/>
+                  </a:prstGeom>
+                  <a:solidFill>
+                    <a:schemeClr val="tx1"/>
+                  </a:solidFill>
+                  <a:ln w="38100">
+                    <a:solidFill>
+                      <a:schemeClr val="tx1"/>
+                    </a:solidFill>
+                  </a:ln>
+                </p:spPr>
+                <p:style>
+                  <a:lnRef idx="2">
+                    <a:schemeClr val="accent1">
+                      <a:shade val="50000"/>
+                    </a:schemeClr>
+                  </a:lnRef>
+                  <a:fillRef idx="1">
+                    <a:schemeClr val="accent1"/>
+                  </a:fillRef>
+                  <a:effectRef idx="0">
+                    <a:schemeClr val="accent1"/>
+                  </a:effectRef>
+                  <a:fontRef idx="minor">
+                    <a:schemeClr val="lt1"/>
+                  </a:fontRef>
+                </p:style>
+                <p:txBody>
+                  <a:bodyPr rtlCol="0" anchor="ctr"/>
+                  <a:lstStyle/>
+                  <a:p>
+                    <a:pPr algn="ctr"/>
+                    <a:endParaRPr lang="en-CA"/>
+                  </a:p>
+                </p:txBody>
+              </p:sp>
+            </p:grpSp>
+            <p:sp>
+              <p:nvSpPr>
+                <p:cNvPr id="23" name="Oval 22"/>
+                <p:cNvSpPr/>
+                <p:nvPr/>
+              </p:nvSpPr>
+              <p:spPr>
+                <a:xfrm>
+                  <a:off x="6446584" y="3164615"/>
+                  <a:ext cx="853440" cy="857789"/>
+                </a:xfrm>
+                <a:prstGeom prst="ellipse">
+                  <a:avLst/>
+                </a:prstGeom>
+                <a:noFill/>
+                <a:ln w="38100">
+                  <a:solidFill>
+                    <a:schemeClr val="tx1"/>
+                  </a:solidFill>
+                </a:ln>
+              </p:spPr>
+              <p:style>
+                <a:lnRef idx="2">
+                  <a:schemeClr val="accent1">
+                    <a:shade val="50000"/>
+                  </a:schemeClr>
+                </a:lnRef>
+                <a:fillRef idx="1">
+                  <a:schemeClr val="accent1"/>
+                </a:fillRef>
+                <a:effectRef idx="0">
+                  <a:schemeClr val="accent1"/>
+                </a:effectRef>
+                <a:fontRef idx="minor">
+                  <a:schemeClr val="lt1"/>
+                </a:fontRef>
+              </p:style>
+              <p:txBody>
+                <a:bodyPr rtlCol="0" anchor="ctr"/>
+                <a:lstStyle/>
+                <a:p>
+                  <a:pPr algn="ctr"/>
+                  <a:endParaRPr lang="en-CA"/>
+                </a:p>
+              </p:txBody>
+            </p:sp>
+            <p:sp>
+              <p:nvSpPr>
+                <p:cNvPr id="24" name="TextBox 23"/>
+                <p:cNvSpPr txBox="1"/>
+                <p:nvPr/>
+              </p:nvSpPr>
+              <p:spPr>
+                <a:xfrm>
+                  <a:off x="4657999" y="1187141"/>
+                  <a:ext cx="1536245" cy="830997"/>
+                </a:xfrm>
+                <a:prstGeom prst="rect">
+                  <a:avLst/>
+                </a:prstGeom>
+                <a:noFill/>
+              </p:spPr>
+              <p:txBody>
+                <a:bodyPr wrap="square" rtlCol="0">
+                  <a:spAutoFit/>
+                </a:bodyPr>
+                <a:lstStyle/>
+                <a:p>
+                  <a:r>
+                    <a:rPr lang="en-CA" sz="2400" dirty="0" smtClean="0"/>
+                    <a:t>10 hidden nodes</a:t>
+                  </a:r>
+                  <a:endParaRPr lang="en-CA" sz="2400" dirty="0"/>
+                </a:p>
+              </p:txBody>
+            </p:sp>
+            <p:sp>
+              <p:nvSpPr>
+                <p:cNvPr id="25" name="TextBox 24"/>
+                <p:cNvSpPr txBox="1"/>
+                <p:nvPr/>
+              </p:nvSpPr>
+              <p:spPr>
+                <a:xfrm>
+                  <a:off x="6246629" y="1161014"/>
+                  <a:ext cx="1253349" cy="830997"/>
+                </a:xfrm>
+                <a:prstGeom prst="rect">
+                  <a:avLst/>
+                </a:prstGeom>
+                <a:noFill/>
+              </p:spPr>
+              <p:txBody>
+                <a:bodyPr wrap="square" rtlCol="0">
+                  <a:spAutoFit/>
+                </a:bodyPr>
+                <a:lstStyle/>
+                <a:p>
+                  <a:r>
+                    <a:rPr lang="en-CA" sz="2400" dirty="0" smtClean="0"/>
+                    <a:t>1 output node</a:t>
+                  </a:r>
+                  <a:endParaRPr lang="en-CA" sz="2400" dirty="0"/>
+                </a:p>
+              </p:txBody>
+            </p:sp>
+            <p:cxnSp>
+              <p:nvCxnSpPr>
+                <p:cNvPr id="27" name="Straight Arrow Connector 26"/>
+                <p:cNvCxnSpPr>
+                  <a:stCxn id="4" idx="3"/>
+                  <a:endCxn id="6" idx="2"/>
+                </p:cNvCxnSpPr>
+                <p:nvPr/>
+              </p:nvCxnSpPr>
+              <p:spPr>
+                <a:xfrm flipV="1">
+                  <a:off x="1861459" y="2299061"/>
+                  <a:ext cx="1238792" cy="1026487"/>
+                </a:xfrm>
+                <a:prstGeom prst="straightConnector1">
+                  <a:avLst/>
+                </a:prstGeom>
+                <a:ln w="28575">
+                  <a:solidFill>
+                    <a:schemeClr val="tx1"/>
+                  </a:solidFill>
+                  <a:tailEnd type="triangle"/>
+                </a:ln>
+              </p:spPr>
+              <p:style>
+                <a:lnRef idx="1">
+                  <a:schemeClr val="accent1"/>
+                </a:lnRef>
+                <a:fillRef idx="0">
+                  <a:schemeClr val="accent1"/>
+                </a:fillRef>
+                <a:effectRef idx="0">
+                  <a:schemeClr val="accent1"/>
+                </a:effectRef>
+                <a:fontRef idx="minor">
+                  <a:schemeClr val="tx1"/>
+                </a:fontRef>
+              </p:style>
+            </p:cxnSp>
+            <p:cxnSp>
+              <p:nvCxnSpPr>
+                <p:cNvPr id="29" name="Straight Arrow Connector 28"/>
+                <p:cNvCxnSpPr>
+                  <a:stCxn id="4" idx="3"/>
+                  <a:endCxn id="7" idx="2"/>
+                </p:cNvCxnSpPr>
+                <p:nvPr/>
+              </p:nvCxnSpPr>
+              <p:spPr>
+                <a:xfrm flipV="1">
+                  <a:off x="1861459" y="3020746"/>
+                  <a:ext cx="1238792" cy="304802"/>
+                </a:xfrm>
+                <a:prstGeom prst="straightConnector1">
+                  <a:avLst/>
+                </a:prstGeom>
+                <a:ln w="28575">
+                  <a:solidFill>
+                    <a:schemeClr val="tx1"/>
+                  </a:solidFill>
+                  <a:tailEnd type="triangle"/>
+                </a:ln>
+              </p:spPr>
+              <p:style>
+                <a:lnRef idx="1">
+                  <a:schemeClr val="accent1"/>
+                </a:lnRef>
+                <a:fillRef idx="0">
+                  <a:schemeClr val="accent1"/>
+                </a:fillRef>
+                <a:effectRef idx="0">
+                  <a:schemeClr val="accent1"/>
+                </a:effectRef>
+                <a:fontRef idx="minor">
+                  <a:schemeClr val="tx1"/>
+                </a:fontRef>
+              </p:style>
+            </p:cxnSp>
+            <p:cxnSp>
+              <p:nvCxnSpPr>
+                <p:cNvPr id="31" name="Straight Arrow Connector 30"/>
+                <p:cNvCxnSpPr>
+                  <a:stCxn id="4" idx="3"/>
+                  <a:endCxn id="8" idx="2"/>
+                </p:cNvCxnSpPr>
+                <p:nvPr/>
+              </p:nvCxnSpPr>
+              <p:spPr>
+                <a:xfrm>
+                  <a:off x="1861459" y="3325548"/>
+                  <a:ext cx="1238792" cy="1162592"/>
+                </a:xfrm>
+                <a:prstGeom prst="straightConnector1">
+                  <a:avLst/>
+                </a:prstGeom>
+                <a:ln w="28575">
+                  <a:solidFill>
+                    <a:schemeClr val="tx1"/>
+                  </a:solidFill>
+                  <a:tailEnd type="triangle"/>
+                </a:ln>
+              </p:spPr>
+              <p:style>
+                <a:lnRef idx="1">
+                  <a:schemeClr val="accent1"/>
+                </a:lnRef>
+                <a:fillRef idx="0">
+                  <a:schemeClr val="accent1"/>
+                </a:fillRef>
+                <a:effectRef idx="0">
+                  <a:schemeClr val="accent1"/>
+                </a:effectRef>
+                <a:fontRef idx="minor">
+                  <a:schemeClr val="tx1"/>
+                </a:fontRef>
+              </p:style>
+            </p:cxnSp>
+            <p:cxnSp>
+              <p:nvCxnSpPr>
+                <p:cNvPr id="33" name="Straight Arrow Connector 32"/>
+                <p:cNvCxnSpPr>
+                  <a:stCxn id="4" idx="3"/>
+                  <a:endCxn id="9" idx="2"/>
+                </p:cNvCxnSpPr>
+                <p:nvPr/>
+              </p:nvCxnSpPr>
+              <p:spPr>
+                <a:xfrm>
+                  <a:off x="1861459" y="3325548"/>
+                  <a:ext cx="1238792" cy="1942009"/>
+                </a:xfrm>
+                <a:prstGeom prst="straightConnector1">
+                  <a:avLst/>
+                </a:prstGeom>
+                <a:ln w="28575">
+                  <a:solidFill>
+                    <a:schemeClr val="tx1"/>
+                  </a:solidFill>
+                  <a:tailEnd type="triangle"/>
+                </a:ln>
+              </p:spPr>
+              <p:style>
+                <a:lnRef idx="1">
+                  <a:schemeClr val="accent1"/>
+                </a:lnRef>
+                <a:fillRef idx="0">
+                  <a:schemeClr val="accent1"/>
+                </a:fillRef>
+                <a:effectRef idx="0">
+                  <a:schemeClr val="accent1"/>
+                </a:effectRef>
+                <a:fontRef idx="minor">
+                  <a:schemeClr val="tx1"/>
+                </a:fontRef>
+              </p:style>
+            </p:cxnSp>
+            <p:cxnSp>
+              <p:nvCxnSpPr>
+                <p:cNvPr id="35" name="Straight Arrow Connector 34"/>
+                <p:cNvCxnSpPr>
+                  <a:stCxn id="6" idx="6"/>
+                  <a:endCxn id="16" idx="2"/>
+                </p:cNvCxnSpPr>
+                <p:nvPr/>
+              </p:nvCxnSpPr>
+              <p:spPr>
+                <a:xfrm>
+                  <a:off x="3735977" y="2299061"/>
+                  <a:ext cx="1311730" cy="3213"/>
+                </a:xfrm>
+                <a:prstGeom prst="straightConnector1">
+                  <a:avLst/>
+                </a:prstGeom>
+                <a:ln w="28575">
+                  <a:solidFill>
+                    <a:schemeClr val="tx1"/>
+                  </a:solidFill>
+                  <a:tailEnd type="triangle"/>
+                </a:ln>
+              </p:spPr>
+              <p:style>
+                <a:lnRef idx="1">
+                  <a:schemeClr val="accent1"/>
+                </a:lnRef>
+                <a:fillRef idx="0">
+                  <a:schemeClr val="accent1"/>
+                </a:fillRef>
+                <a:effectRef idx="0">
+                  <a:schemeClr val="accent1"/>
+                </a:effectRef>
+                <a:fontRef idx="minor">
+                  <a:schemeClr val="tx1"/>
+                </a:fontRef>
+              </p:style>
+            </p:cxnSp>
+            <p:cxnSp>
+              <p:nvCxnSpPr>
+                <p:cNvPr id="37" name="Straight Arrow Connector 36"/>
+                <p:cNvCxnSpPr>
+                  <a:stCxn id="6" idx="6"/>
+                  <a:endCxn id="17" idx="2"/>
+                </p:cNvCxnSpPr>
+                <p:nvPr/>
+              </p:nvCxnSpPr>
+              <p:spPr>
+                <a:xfrm>
+                  <a:off x="3735977" y="2299061"/>
+                  <a:ext cx="1311730" cy="724898"/>
+                </a:xfrm>
+                <a:prstGeom prst="straightConnector1">
+                  <a:avLst/>
+                </a:prstGeom>
+                <a:ln w="28575">
+                  <a:solidFill>
+                    <a:schemeClr val="tx1"/>
+                  </a:solidFill>
+                  <a:tailEnd type="triangle"/>
+                </a:ln>
+              </p:spPr>
+              <p:style>
+                <a:lnRef idx="1">
+                  <a:schemeClr val="accent1"/>
+                </a:lnRef>
+                <a:fillRef idx="0">
+                  <a:schemeClr val="accent1"/>
+                </a:fillRef>
+                <a:effectRef idx="0">
+                  <a:schemeClr val="accent1"/>
+                </a:effectRef>
+                <a:fontRef idx="minor">
+                  <a:schemeClr val="tx1"/>
+                </a:fontRef>
+              </p:style>
+            </p:cxnSp>
+            <p:cxnSp>
+              <p:nvCxnSpPr>
+                <p:cNvPr id="39" name="Straight Arrow Connector 38"/>
+                <p:cNvCxnSpPr>
+                  <a:stCxn id="6" idx="6"/>
+                  <a:endCxn id="18" idx="2"/>
+                </p:cNvCxnSpPr>
+                <p:nvPr/>
+              </p:nvCxnSpPr>
+              <p:spPr>
+                <a:xfrm>
+                  <a:off x="3735977" y="2299061"/>
+                  <a:ext cx="1311730" cy="2192292"/>
+                </a:xfrm>
+                <a:prstGeom prst="straightConnector1">
+                  <a:avLst/>
+                </a:prstGeom>
+                <a:ln w="28575">
+                  <a:solidFill>
+                    <a:schemeClr val="tx1"/>
+                  </a:solidFill>
+                  <a:tailEnd type="triangle"/>
+                </a:ln>
+              </p:spPr>
+              <p:style>
+                <a:lnRef idx="1">
+                  <a:schemeClr val="accent1"/>
+                </a:lnRef>
+                <a:fillRef idx="0">
+                  <a:schemeClr val="accent1"/>
+                </a:fillRef>
+                <a:effectRef idx="0">
+                  <a:schemeClr val="accent1"/>
+                </a:effectRef>
+                <a:fontRef idx="minor">
+                  <a:schemeClr val="tx1"/>
+                </a:fontRef>
+              </p:style>
+            </p:cxnSp>
+            <p:cxnSp>
+              <p:nvCxnSpPr>
+                <p:cNvPr id="41" name="Straight Arrow Connector 40"/>
+                <p:cNvCxnSpPr>
+                  <a:stCxn id="6" idx="6"/>
+                  <a:endCxn id="19" idx="2"/>
+                </p:cNvCxnSpPr>
+                <p:nvPr/>
+              </p:nvCxnSpPr>
+              <p:spPr>
+                <a:xfrm>
+                  <a:off x="3735977" y="2299061"/>
+                  <a:ext cx="1311730" cy="2971709"/>
+                </a:xfrm>
+                <a:prstGeom prst="straightConnector1">
+                  <a:avLst/>
+                </a:prstGeom>
+                <a:ln w="28575">
+                  <a:solidFill>
+                    <a:schemeClr val="tx1"/>
+                  </a:solidFill>
+                  <a:tailEnd type="triangle"/>
+                </a:ln>
+              </p:spPr>
+              <p:style>
+                <a:lnRef idx="1">
+                  <a:schemeClr val="accent1"/>
+                </a:lnRef>
+                <a:fillRef idx="0">
+                  <a:schemeClr val="accent1"/>
+                </a:fillRef>
+                <a:effectRef idx="0">
+                  <a:schemeClr val="accent1"/>
+                </a:effectRef>
+                <a:fontRef idx="minor">
+                  <a:schemeClr val="tx1"/>
+                </a:fontRef>
+              </p:style>
+            </p:cxnSp>
+            <p:cxnSp>
+              <p:nvCxnSpPr>
+                <p:cNvPr id="43" name="Straight Arrow Connector 42"/>
+                <p:cNvCxnSpPr>
+                  <a:stCxn id="7" idx="6"/>
+                  <a:endCxn id="16" idx="2"/>
+                </p:cNvCxnSpPr>
+                <p:nvPr/>
+              </p:nvCxnSpPr>
+              <p:spPr>
+                <a:xfrm flipV="1">
+                  <a:off x="3735977" y="2302274"/>
+                  <a:ext cx="1311730" cy="718472"/>
+                </a:xfrm>
+                <a:prstGeom prst="straightConnector1">
+                  <a:avLst/>
+                </a:prstGeom>
+                <a:ln w="28575">
+                  <a:solidFill>
+                    <a:schemeClr val="tx1"/>
+                  </a:solidFill>
+                  <a:tailEnd type="triangle"/>
+                </a:ln>
+              </p:spPr>
+              <p:style>
+                <a:lnRef idx="1">
+                  <a:schemeClr val="accent1"/>
+                </a:lnRef>
+                <a:fillRef idx="0">
+                  <a:schemeClr val="accent1"/>
+                </a:fillRef>
+                <a:effectRef idx="0">
+                  <a:schemeClr val="accent1"/>
+                </a:effectRef>
+                <a:fontRef idx="minor">
+                  <a:schemeClr val="tx1"/>
+                </a:fontRef>
+              </p:style>
+            </p:cxnSp>
+            <p:cxnSp>
+              <p:nvCxnSpPr>
+                <p:cNvPr id="45" name="Straight Arrow Connector 44"/>
+                <p:cNvCxnSpPr>
+                  <a:stCxn id="7" idx="6"/>
+                  <a:endCxn id="17" idx="2"/>
+                </p:cNvCxnSpPr>
+                <p:nvPr/>
+              </p:nvCxnSpPr>
+              <p:spPr>
+                <a:xfrm>
+                  <a:off x="3735977" y="3020746"/>
+                  <a:ext cx="1311730" cy="3213"/>
+                </a:xfrm>
+                <a:prstGeom prst="straightConnector1">
+                  <a:avLst/>
+                </a:prstGeom>
+                <a:ln w="28575">
+                  <a:solidFill>
+                    <a:schemeClr val="tx1"/>
+                  </a:solidFill>
+                  <a:tailEnd type="triangle"/>
+                </a:ln>
+              </p:spPr>
+              <p:style>
+                <a:lnRef idx="1">
+                  <a:schemeClr val="accent1"/>
+                </a:lnRef>
+                <a:fillRef idx="0">
+                  <a:schemeClr val="accent1"/>
+                </a:fillRef>
+                <a:effectRef idx="0">
+                  <a:schemeClr val="accent1"/>
+                </a:effectRef>
+                <a:fontRef idx="minor">
+                  <a:schemeClr val="tx1"/>
+                </a:fontRef>
+              </p:style>
+            </p:cxnSp>
+            <p:cxnSp>
+              <p:nvCxnSpPr>
+                <p:cNvPr id="47" name="Straight Arrow Connector 46"/>
+                <p:cNvCxnSpPr>
+                  <a:stCxn id="7" idx="6"/>
+                  <a:endCxn id="18" idx="2"/>
+                </p:cNvCxnSpPr>
+                <p:nvPr/>
+              </p:nvCxnSpPr>
+              <p:spPr>
+                <a:xfrm>
+                  <a:off x="3735977" y="3020746"/>
+                  <a:ext cx="1311730" cy="1470607"/>
+                </a:xfrm>
+                <a:prstGeom prst="straightConnector1">
+                  <a:avLst/>
+                </a:prstGeom>
+                <a:ln w="28575">
+                  <a:solidFill>
+                    <a:schemeClr val="tx1"/>
+                  </a:solidFill>
+                  <a:tailEnd type="triangle"/>
+                </a:ln>
+              </p:spPr>
+              <p:style>
+                <a:lnRef idx="1">
+                  <a:schemeClr val="accent1"/>
+                </a:lnRef>
+                <a:fillRef idx="0">
+                  <a:schemeClr val="accent1"/>
+                </a:fillRef>
+                <a:effectRef idx="0">
+                  <a:schemeClr val="accent1"/>
+                </a:effectRef>
+                <a:fontRef idx="minor">
+                  <a:schemeClr val="tx1"/>
+                </a:fontRef>
+              </p:style>
+            </p:cxnSp>
+            <p:cxnSp>
+              <p:nvCxnSpPr>
+                <p:cNvPr id="49" name="Straight Arrow Connector 48"/>
+                <p:cNvCxnSpPr>
+                  <a:stCxn id="7" idx="6"/>
+                  <a:endCxn id="19" idx="2"/>
+                </p:cNvCxnSpPr>
+                <p:nvPr/>
+              </p:nvCxnSpPr>
+              <p:spPr>
+                <a:xfrm>
+                  <a:off x="3735977" y="3020746"/>
+                  <a:ext cx="1311730" cy="2250024"/>
+                </a:xfrm>
+                <a:prstGeom prst="straightConnector1">
+                  <a:avLst/>
+                </a:prstGeom>
+                <a:ln w="28575">
+                  <a:solidFill>
+                    <a:schemeClr val="tx1"/>
+                  </a:solidFill>
+                  <a:tailEnd type="triangle"/>
+                </a:ln>
+              </p:spPr>
+              <p:style>
+                <a:lnRef idx="1">
+                  <a:schemeClr val="accent1"/>
+                </a:lnRef>
+                <a:fillRef idx="0">
+                  <a:schemeClr val="accent1"/>
+                </a:fillRef>
+                <a:effectRef idx="0">
+                  <a:schemeClr val="accent1"/>
+                </a:effectRef>
+                <a:fontRef idx="minor">
+                  <a:schemeClr val="tx1"/>
+                </a:fontRef>
+              </p:style>
+            </p:cxnSp>
+            <p:cxnSp>
+              <p:nvCxnSpPr>
+                <p:cNvPr id="51" name="Straight Arrow Connector 50"/>
+                <p:cNvCxnSpPr>
+                  <a:stCxn id="8" idx="6"/>
+                  <a:endCxn id="16" idx="2"/>
+                </p:cNvCxnSpPr>
+                <p:nvPr/>
+              </p:nvCxnSpPr>
+              <p:spPr>
+                <a:xfrm flipV="1">
+                  <a:off x="3735977" y="2302274"/>
+                  <a:ext cx="1311730" cy="2185866"/>
+                </a:xfrm>
+                <a:prstGeom prst="straightConnector1">
+                  <a:avLst/>
+                </a:prstGeom>
+                <a:ln w="28575">
+                  <a:solidFill>
+                    <a:schemeClr val="tx1"/>
+                  </a:solidFill>
+                  <a:tailEnd type="triangle"/>
+                </a:ln>
+              </p:spPr>
+              <p:style>
+                <a:lnRef idx="1">
+                  <a:schemeClr val="accent1"/>
+                </a:lnRef>
+                <a:fillRef idx="0">
+                  <a:schemeClr val="accent1"/>
+                </a:fillRef>
+                <a:effectRef idx="0">
+                  <a:schemeClr val="accent1"/>
+                </a:effectRef>
+                <a:fontRef idx="minor">
+                  <a:schemeClr val="tx1"/>
+                </a:fontRef>
+              </p:style>
+            </p:cxnSp>
+            <p:cxnSp>
+              <p:nvCxnSpPr>
+                <p:cNvPr id="53" name="Straight Arrow Connector 52"/>
+                <p:cNvCxnSpPr>
+                  <a:stCxn id="8" idx="6"/>
+                  <a:endCxn id="17" idx="2"/>
+                </p:cNvCxnSpPr>
+                <p:nvPr/>
+              </p:nvCxnSpPr>
+              <p:spPr>
+                <a:xfrm flipV="1">
+                  <a:off x="3735977" y="3023959"/>
+                  <a:ext cx="1311730" cy="1464181"/>
+                </a:xfrm>
+                <a:prstGeom prst="straightConnector1">
+                  <a:avLst/>
+                </a:prstGeom>
+                <a:ln w="28575">
+                  <a:solidFill>
+                    <a:schemeClr val="tx1"/>
+                  </a:solidFill>
+                  <a:tailEnd type="triangle"/>
+                </a:ln>
+              </p:spPr>
+              <p:style>
+                <a:lnRef idx="1">
+                  <a:schemeClr val="accent1"/>
+                </a:lnRef>
+                <a:fillRef idx="0">
+                  <a:schemeClr val="accent1"/>
+                </a:fillRef>
+                <a:effectRef idx="0">
+                  <a:schemeClr val="accent1"/>
+                </a:effectRef>
+                <a:fontRef idx="minor">
+                  <a:schemeClr val="tx1"/>
+                </a:fontRef>
+              </p:style>
+            </p:cxnSp>
+            <p:cxnSp>
+              <p:nvCxnSpPr>
+                <p:cNvPr id="55" name="Straight Arrow Connector 54"/>
+                <p:cNvCxnSpPr>
+                  <a:stCxn id="8" idx="6"/>
+                  <a:endCxn id="18" idx="2"/>
+                </p:cNvCxnSpPr>
+                <p:nvPr/>
+              </p:nvCxnSpPr>
+              <p:spPr>
+                <a:xfrm>
+                  <a:off x="3735977" y="4488140"/>
+                  <a:ext cx="1311730" cy="3213"/>
+                </a:xfrm>
+                <a:prstGeom prst="straightConnector1">
+                  <a:avLst/>
+                </a:prstGeom>
+                <a:ln w="28575">
+                  <a:solidFill>
+                    <a:schemeClr val="tx1"/>
+                  </a:solidFill>
+                  <a:tailEnd type="triangle"/>
+                </a:ln>
+              </p:spPr>
+              <p:style>
+                <a:lnRef idx="1">
+                  <a:schemeClr val="accent1"/>
+                </a:lnRef>
+                <a:fillRef idx="0">
+                  <a:schemeClr val="accent1"/>
+                </a:fillRef>
+                <a:effectRef idx="0">
+                  <a:schemeClr val="accent1"/>
+                </a:effectRef>
+                <a:fontRef idx="minor">
+                  <a:schemeClr val="tx1"/>
+                </a:fontRef>
+              </p:style>
+            </p:cxnSp>
+            <p:cxnSp>
+              <p:nvCxnSpPr>
+                <p:cNvPr id="57" name="Straight Arrow Connector 56"/>
+                <p:cNvCxnSpPr>
+                  <a:stCxn id="8" idx="6"/>
+                  <a:endCxn id="19" idx="2"/>
+                </p:cNvCxnSpPr>
+                <p:nvPr/>
+              </p:nvCxnSpPr>
+              <p:spPr>
+                <a:xfrm>
+                  <a:off x="3735977" y="4488140"/>
+                  <a:ext cx="1311730" cy="782630"/>
+                </a:xfrm>
+                <a:prstGeom prst="straightConnector1">
+                  <a:avLst/>
+                </a:prstGeom>
+                <a:ln w="28575">
+                  <a:solidFill>
+                    <a:schemeClr val="tx1"/>
+                  </a:solidFill>
+                  <a:tailEnd type="triangle"/>
+                </a:ln>
+              </p:spPr>
+              <p:style>
+                <a:lnRef idx="1">
+                  <a:schemeClr val="accent1"/>
+                </a:lnRef>
+                <a:fillRef idx="0">
+                  <a:schemeClr val="accent1"/>
+                </a:fillRef>
+                <a:effectRef idx="0">
+                  <a:schemeClr val="accent1"/>
+                </a:effectRef>
+                <a:fontRef idx="minor">
+                  <a:schemeClr val="tx1"/>
+                </a:fontRef>
+              </p:style>
+            </p:cxnSp>
+            <p:cxnSp>
+              <p:nvCxnSpPr>
+                <p:cNvPr id="59" name="Straight Arrow Connector 58"/>
+                <p:cNvCxnSpPr>
+                  <a:stCxn id="9" idx="6"/>
+                  <a:endCxn id="16" idx="2"/>
+                </p:cNvCxnSpPr>
+                <p:nvPr/>
+              </p:nvCxnSpPr>
+              <p:spPr>
+                <a:xfrm flipV="1">
+                  <a:off x="3735977" y="2302274"/>
+                  <a:ext cx="1311730" cy="2965283"/>
+                </a:xfrm>
+                <a:prstGeom prst="straightConnector1">
+                  <a:avLst/>
+                </a:prstGeom>
+                <a:ln w="28575">
+                  <a:solidFill>
+                    <a:schemeClr val="tx1"/>
+                  </a:solidFill>
+                  <a:tailEnd type="triangle"/>
+                </a:ln>
+              </p:spPr>
+              <p:style>
+                <a:lnRef idx="1">
+                  <a:schemeClr val="accent1"/>
+                </a:lnRef>
+                <a:fillRef idx="0">
+                  <a:schemeClr val="accent1"/>
+                </a:fillRef>
+                <a:effectRef idx="0">
+                  <a:schemeClr val="accent1"/>
+                </a:effectRef>
+                <a:fontRef idx="minor">
+                  <a:schemeClr val="tx1"/>
+                </a:fontRef>
+              </p:style>
+            </p:cxnSp>
+            <p:cxnSp>
+              <p:nvCxnSpPr>
+                <p:cNvPr id="61" name="Straight Arrow Connector 60"/>
+                <p:cNvCxnSpPr>
+                  <a:stCxn id="9" idx="6"/>
+                  <a:endCxn id="17" idx="2"/>
+                </p:cNvCxnSpPr>
+                <p:nvPr/>
+              </p:nvCxnSpPr>
+              <p:spPr>
+                <a:xfrm flipV="1">
+                  <a:off x="3735977" y="3023959"/>
+                  <a:ext cx="1311730" cy="2243598"/>
+                </a:xfrm>
+                <a:prstGeom prst="straightConnector1">
+                  <a:avLst/>
+                </a:prstGeom>
+                <a:ln w="28575">
+                  <a:solidFill>
+                    <a:schemeClr val="tx1"/>
+                  </a:solidFill>
+                  <a:tailEnd type="triangle"/>
+                </a:ln>
+              </p:spPr>
+              <p:style>
+                <a:lnRef idx="1">
+                  <a:schemeClr val="accent1"/>
+                </a:lnRef>
+                <a:fillRef idx="0">
+                  <a:schemeClr val="accent1"/>
+                </a:fillRef>
+                <a:effectRef idx="0">
+                  <a:schemeClr val="accent1"/>
+                </a:effectRef>
+                <a:fontRef idx="minor">
+                  <a:schemeClr val="tx1"/>
+                </a:fontRef>
+              </p:style>
+            </p:cxnSp>
+            <p:cxnSp>
+              <p:nvCxnSpPr>
+                <p:cNvPr id="63" name="Straight Arrow Connector 62"/>
+                <p:cNvCxnSpPr>
+                  <a:stCxn id="9" idx="6"/>
+                  <a:endCxn id="18" idx="2"/>
+                </p:cNvCxnSpPr>
+                <p:nvPr/>
+              </p:nvCxnSpPr>
+              <p:spPr>
+                <a:xfrm flipV="1">
+                  <a:off x="3735977" y="4491353"/>
+                  <a:ext cx="1311730" cy="776204"/>
+                </a:xfrm>
+                <a:prstGeom prst="straightConnector1">
+                  <a:avLst/>
+                </a:prstGeom>
+                <a:ln w="28575">
+                  <a:solidFill>
+                    <a:schemeClr val="tx1"/>
+                  </a:solidFill>
+                  <a:tailEnd type="triangle"/>
+                </a:ln>
+              </p:spPr>
+              <p:style>
+                <a:lnRef idx="1">
+                  <a:schemeClr val="accent1"/>
+                </a:lnRef>
+                <a:fillRef idx="0">
+                  <a:schemeClr val="accent1"/>
+                </a:fillRef>
+                <a:effectRef idx="0">
+                  <a:schemeClr val="accent1"/>
+                </a:effectRef>
+                <a:fontRef idx="minor">
+                  <a:schemeClr val="tx1"/>
+                </a:fontRef>
+              </p:style>
+            </p:cxnSp>
+            <p:cxnSp>
+              <p:nvCxnSpPr>
+                <p:cNvPr id="65" name="Straight Arrow Connector 64"/>
+                <p:cNvCxnSpPr>
+                  <a:stCxn id="9" idx="6"/>
+                  <a:endCxn id="19" idx="2"/>
+                </p:cNvCxnSpPr>
+                <p:nvPr/>
+              </p:nvCxnSpPr>
+              <p:spPr>
+                <a:xfrm>
+                  <a:off x="3735977" y="5267557"/>
+                  <a:ext cx="1311730" cy="3213"/>
+                </a:xfrm>
+                <a:prstGeom prst="straightConnector1">
+                  <a:avLst/>
+                </a:prstGeom>
+                <a:ln w="28575">
+                  <a:solidFill>
+                    <a:schemeClr val="tx1"/>
+                  </a:solidFill>
+                  <a:tailEnd type="triangle"/>
+                </a:ln>
+              </p:spPr>
+              <p:style>
+                <a:lnRef idx="1">
+                  <a:schemeClr val="accent1"/>
+                </a:lnRef>
+                <a:fillRef idx="0">
+                  <a:schemeClr val="accent1"/>
+                </a:fillRef>
+                <a:effectRef idx="0">
+                  <a:schemeClr val="accent1"/>
+                </a:effectRef>
+                <a:fontRef idx="minor">
+                  <a:schemeClr val="tx1"/>
+                </a:fontRef>
+              </p:style>
+            </p:cxnSp>
+            <p:cxnSp>
+              <p:nvCxnSpPr>
+                <p:cNvPr id="67" name="Straight Arrow Connector 66"/>
+                <p:cNvCxnSpPr>
+                  <a:stCxn id="16" idx="6"/>
+                  <a:endCxn id="23" idx="2"/>
+                </p:cNvCxnSpPr>
+                <p:nvPr/>
+              </p:nvCxnSpPr>
+              <p:spPr>
+                <a:xfrm>
+                  <a:off x="5683433" y="2302274"/>
+                  <a:ext cx="763151" cy="1291236"/>
+                </a:xfrm>
+                <a:prstGeom prst="straightConnector1">
+                  <a:avLst/>
+                </a:prstGeom>
+                <a:ln w="28575">
+                  <a:solidFill>
+                    <a:schemeClr val="tx1"/>
+                  </a:solidFill>
+                  <a:tailEnd type="triangle"/>
+                </a:ln>
+              </p:spPr>
+              <p:style>
+                <a:lnRef idx="1">
+                  <a:schemeClr val="accent1"/>
+                </a:lnRef>
+                <a:fillRef idx="0">
+                  <a:schemeClr val="accent1"/>
+                </a:fillRef>
+                <a:effectRef idx="0">
+                  <a:schemeClr val="accent1"/>
+                </a:effectRef>
+                <a:fontRef idx="minor">
+                  <a:schemeClr val="tx1"/>
+                </a:fontRef>
+              </p:style>
+            </p:cxnSp>
+            <p:cxnSp>
+              <p:nvCxnSpPr>
+                <p:cNvPr id="69" name="Straight Arrow Connector 68"/>
+                <p:cNvCxnSpPr>
+                  <a:stCxn id="17" idx="6"/>
+                  <a:endCxn id="23" idx="2"/>
+                </p:cNvCxnSpPr>
+                <p:nvPr/>
+              </p:nvCxnSpPr>
+              <p:spPr>
+                <a:xfrm>
+                  <a:off x="5683433" y="3023959"/>
+                  <a:ext cx="763151" cy="569551"/>
+                </a:xfrm>
+                <a:prstGeom prst="straightConnector1">
+                  <a:avLst/>
+                </a:prstGeom>
+                <a:ln w="28575">
+                  <a:solidFill>
+                    <a:schemeClr val="tx1"/>
+                  </a:solidFill>
+                  <a:tailEnd type="triangle"/>
+                </a:ln>
+              </p:spPr>
+              <p:style>
+                <a:lnRef idx="1">
+                  <a:schemeClr val="accent1"/>
+                </a:lnRef>
+                <a:fillRef idx="0">
+                  <a:schemeClr val="accent1"/>
+                </a:fillRef>
+                <a:effectRef idx="0">
+                  <a:schemeClr val="accent1"/>
+                </a:effectRef>
+                <a:fontRef idx="minor">
+                  <a:schemeClr val="tx1"/>
+                </a:fontRef>
+              </p:style>
+            </p:cxnSp>
+            <p:cxnSp>
+              <p:nvCxnSpPr>
+                <p:cNvPr id="71" name="Straight Arrow Connector 70"/>
+                <p:cNvCxnSpPr>
+                  <a:stCxn id="18" idx="6"/>
+                  <a:endCxn id="23" idx="2"/>
+                </p:cNvCxnSpPr>
+                <p:nvPr/>
+              </p:nvCxnSpPr>
+              <p:spPr>
+                <a:xfrm flipV="1">
+                  <a:off x="5683433" y="3593510"/>
+                  <a:ext cx="763151" cy="897843"/>
+                </a:xfrm>
+                <a:prstGeom prst="straightConnector1">
+                  <a:avLst/>
+                </a:prstGeom>
+                <a:ln w="28575">
+                  <a:solidFill>
+                    <a:schemeClr val="tx1"/>
+                  </a:solidFill>
+                  <a:tailEnd type="triangle"/>
+                </a:ln>
+              </p:spPr>
+              <p:style>
+                <a:lnRef idx="1">
+                  <a:schemeClr val="accent1"/>
+                </a:lnRef>
+                <a:fillRef idx="0">
+                  <a:schemeClr val="accent1"/>
+                </a:fillRef>
+                <a:effectRef idx="0">
+                  <a:schemeClr val="accent1"/>
+                </a:effectRef>
+                <a:fontRef idx="minor">
+                  <a:schemeClr val="tx1"/>
+                </a:fontRef>
+              </p:style>
+            </p:cxnSp>
+            <p:cxnSp>
+              <p:nvCxnSpPr>
+                <p:cNvPr id="73" name="Straight Arrow Connector 72"/>
+                <p:cNvCxnSpPr>
+                  <a:stCxn id="19" idx="6"/>
+                  <a:endCxn id="23" idx="2"/>
+                </p:cNvCxnSpPr>
+                <p:nvPr/>
+              </p:nvCxnSpPr>
+              <p:spPr>
+                <a:xfrm flipV="1">
+                  <a:off x="5683433" y="3593510"/>
+                  <a:ext cx="763151" cy="1677260"/>
+                </a:xfrm>
+                <a:prstGeom prst="straightConnector1">
+                  <a:avLst/>
+                </a:prstGeom>
+                <a:ln w="28575">
+                  <a:solidFill>
+                    <a:schemeClr val="tx1"/>
+                  </a:solidFill>
+                  <a:tailEnd type="triangle"/>
+                </a:ln>
+              </p:spPr>
+              <p:style>
+                <a:lnRef idx="1">
+                  <a:schemeClr val="accent1"/>
+                </a:lnRef>
+                <a:fillRef idx="0">
+                  <a:schemeClr val="accent1"/>
+                </a:fillRef>
+                <a:effectRef idx="0">
+                  <a:schemeClr val="accent1"/>
+                </a:effectRef>
+                <a:fontRef idx="minor">
+                  <a:schemeClr val="tx1"/>
+                </a:fontRef>
+              </p:style>
+            </p:cxnSp>
+            <p:grpSp>
+              <p:nvGrpSpPr>
+                <p:cNvPr id="80" name="Group 79"/>
+                <p:cNvGrpSpPr/>
+                <p:nvPr/>
+              </p:nvGrpSpPr>
+              <p:grpSpPr>
+                <a:xfrm>
+                  <a:off x="8948899" y="3249926"/>
+                  <a:ext cx="1004998" cy="723616"/>
+                  <a:chOff x="8600728" y="3194587"/>
+                  <a:chExt cx="1004998" cy="723616"/>
+                </a:xfrm>
+              </p:grpSpPr>
+              <p:sp>
+                <p:nvSpPr>
+                  <p:cNvPr id="78" name="Rectangle 77"/>
+                  <p:cNvSpPr/>
+                  <p:nvPr/>
+                </p:nvSpPr>
+                <p:spPr>
+                  <a:xfrm>
+                    <a:off x="8600728" y="3194587"/>
+                    <a:ext cx="1004998" cy="723616"/>
+                  </a:xfrm>
+                  <a:prstGeom prst="rect">
+                    <a:avLst/>
+                  </a:prstGeom>
+                  <a:noFill/>
+                  <a:ln w="57150">
+                    <a:solidFill>
+                      <a:schemeClr val="tx1"/>
+                    </a:solidFill>
+                  </a:ln>
+                </p:spPr>
+                <p:style>
+                  <a:lnRef idx="2">
+                    <a:schemeClr val="accent1">
+                      <a:shade val="50000"/>
+                    </a:schemeClr>
+                  </a:lnRef>
+                  <a:fillRef idx="1">
+                    <a:schemeClr val="accent1"/>
+                  </a:fillRef>
+                  <a:effectRef idx="0">
+                    <a:schemeClr val="accent1"/>
+                  </a:effectRef>
+                  <a:fontRef idx="minor">
+                    <a:schemeClr val="lt1"/>
+                  </a:fontRef>
+                </p:style>
+                <p:txBody>
+                  <a:bodyPr rtlCol="0" anchor="ctr"/>
+                  <a:lstStyle/>
+                  <a:p>
+                    <a:pPr algn="ctr"/>
+                    <a:endParaRPr lang="en-CA"/>
+                  </a:p>
+                </p:txBody>
+              </p:sp>
+              <p:sp>
+                <p:nvSpPr>
+                  <p:cNvPr id="79" name="TextBox 78"/>
+                  <p:cNvSpPr txBox="1"/>
+                  <p:nvPr/>
+                </p:nvSpPr>
+                <p:spPr>
+                  <a:xfrm>
+                    <a:off x="8600728" y="3205174"/>
+                    <a:ext cx="1004998" cy="646331"/>
+                  </a:xfrm>
+                  <a:prstGeom prst="rect">
+                    <a:avLst/>
+                  </a:prstGeom>
+                  <a:noFill/>
+                </p:spPr>
+                <p:txBody>
+                  <a:bodyPr wrap="square" rtlCol="0">
+                    <a:spAutoFit/>
+                  </a:bodyPr>
+                  <a:lstStyle/>
+                  <a:p>
+                    <a:pPr algn="ctr"/>
+                    <a:r>
+                      <a:rPr lang="en-CA" dirty="0" smtClean="0"/>
+                      <a:t>Multiply by </a:t>
+                    </a:r>
+                    <a:r>
+                      <a:rPr lang="en-CA" dirty="0" smtClean="0"/>
+                      <a:t>240</a:t>
+                    </a:r>
+                    <a:r>
+                      <a:rPr lang="en-CA" baseline="30000" dirty="0" smtClean="0"/>
+                      <a:t>o</a:t>
+                    </a:r>
+                    <a:endParaRPr lang="en-CA" dirty="0"/>
+                  </a:p>
+                </p:txBody>
+              </p:sp>
+            </p:grpSp>
+            <p:cxnSp>
+              <p:nvCxnSpPr>
+                <p:cNvPr id="82" name="Straight Arrow Connector 81"/>
+                <p:cNvCxnSpPr>
+                  <a:stCxn id="23" idx="6"/>
+                </p:cNvCxnSpPr>
+                <p:nvPr/>
+              </p:nvCxnSpPr>
+              <p:spPr>
+                <a:xfrm flipV="1">
+                  <a:off x="7300024" y="3593509"/>
+                  <a:ext cx="370124" cy="1"/>
+                </a:xfrm>
+                <a:prstGeom prst="straightConnector1">
+                  <a:avLst/>
+                </a:prstGeom>
+                <a:ln w="57150">
+                  <a:solidFill>
+                    <a:schemeClr val="tx1"/>
+                  </a:solidFill>
+                  <a:tailEnd type="triangle"/>
+                </a:ln>
+              </p:spPr>
+              <p:style>
+                <a:lnRef idx="1">
+                  <a:schemeClr val="accent1"/>
+                </a:lnRef>
+                <a:fillRef idx="0">
+                  <a:schemeClr val="accent1"/>
+                </a:fillRef>
+                <a:effectRef idx="0">
+                  <a:schemeClr val="accent1"/>
+                </a:effectRef>
+                <a:fontRef idx="minor">
+                  <a:schemeClr val="tx1"/>
+                </a:fontRef>
+              </p:style>
+            </p:cxnSp>
+            <p:sp>
+              <p:nvSpPr>
+                <p:cNvPr id="83" name="Right Arrow 82"/>
+                <p:cNvSpPr/>
+                <p:nvPr/>
+              </p:nvSpPr>
+              <p:spPr>
+                <a:xfrm>
+                  <a:off x="9953897" y="3313995"/>
+                  <a:ext cx="1208313" cy="583474"/>
+                </a:xfrm>
+                <a:prstGeom prst="rightArrow">
+                  <a:avLst/>
+                </a:prstGeom>
                 <a:solidFill>
                   <a:schemeClr val="tx1"/>
                 </a:solidFill>
-              </a:ln>
-            </p:spPr>
-            <p:style>
-              <a:lnRef idx="2">
-                <a:schemeClr val="accent1">
-                  <a:shade val="50000"/>
-                </a:schemeClr>
-              </a:lnRef>
-              <a:fillRef idx="1">
-                <a:schemeClr val="accent1"/>
-              </a:fillRef>
-              <a:effectRef idx="0">
-                <a:schemeClr val="accent1"/>
-              </a:effectRef>
-              <a:fontRef idx="minor">
-                <a:schemeClr val="lt1"/>
-              </a:fontRef>
-            </p:style>
-            <p:txBody>
-              <a:bodyPr rtlCol="0" anchor="ctr"/>
-              <a:lstStyle/>
-              <a:p>
-                <a:pPr algn="ctr"/>
-                <a:endParaRPr lang="en-CA"/>
-              </a:p>
-            </p:txBody>
-          </p:sp>
-          <p:sp>
-            <p:nvSpPr>
-              <p:cNvPr id="8" name="Oval 7"/>
-              <p:cNvSpPr/>
+                <a:ln>
+                  <a:solidFill>
+                    <a:schemeClr val="tx1"/>
+                  </a:solidFill>
+                </a:ln>
+              </p:spPr>
+              <p:style>
+                <a:lnRef idx="2">
+                  <a:schemeClr val="accent1">
+                    <a:shade val="50000"/>
+                  </a:schemeClr>
+                </a:lnRef>
+                <a:fillRef idx="1">
+                  <a:schemeClr val="accent1"/>
+                </a:fillRef>
+                <a:effectRef idx="0">
+                  <a:schemeClr val="accent1"/>
+                </a:effectRef>
+                <a:fontRef idx="minor">
+                  <a:schemeClr val="lt1"/>
+                </a:fontRef>
+              </p:style>
+              <p:txBody>
+                <a:bodyPr rtlCol="0" anchor="ctr"/>
+                <a:lstStyle/>
+                <a:p>
+                  <a:pPr algn="ctr"/>
+                  <a:endParaRPr lang="en-CA"/>
+                </a:p>
+              </p:txBody>
+            </p:sp>
+            <p:sp>
+              <p:nvSpPr>
+                <p:cNvPr id="84" name="TextBox 83"/>
+                <p:cNvSpPr txBox="1"/>
+                <p:nvPr/>
+              </p:nvSpPr>
+              <p:spPr>
+                <a:xfrm>
+                  <a:off x="9953897" y="2457571"/>
+                  <a:ext cx="1426309" cy="830997"/>
+                </a:xfrm>
+                <a:prstGeom prst="rect">
+                  <a:avLst/>
+                </a:prstGeom>
+                <a:noFill/>
+              </p:spPr>
+              <p:txBody>
+                <a:bodyPr wrap="square" rtlCol="0">
+                  <a:spAutoFit/>
+                </a:bodyPr>
+                <a:lstStyle/>
+                <a:p>
+                  <a:r>
+                    <a:rPr lang="en-CA" sz="2400" dirty="0" smtClean="0"/>
+                    <a:t>Curvature estimate</a:t>
+                  </a:r>
+                  <a:endParaRPr lang="en-CA" sz="2400" dirty="0"/>
+                </a:p>
+              </p:txBody>
+            </p:sp>
+          </p:grpSp>
+          <p:grpSp>
+            <p:nvGrpSpPr>
+              <p:cNvPr id="40" name="Group 39"/>
+              <p:cNvGrpSpPr/>
               <p:nvPr/>
-            </p:nvSpPr>
-            <p:spPr>
+            </p:nvGrpSpPr>
+            <p:grpSpPr>
               <a:xfrm>
-                <a:off x="3100251" y="4183337"/>
-                <a:ext cx="635726" cy="609605"/>
+                <a:off x="7644789" y="3255477"/>
+                <a:ext cx="999021" cy="723616"/>
+                <a:chOff x="6967819" y="4141960"/>
+                <a:chExt cx="1160167" cy="723616"/>
               </a:xfrm>
-              <a:prstGeom prst="ellipse">
-                <a:avLst/>
-              </a:prstGeom>
-              <a:noFill/>
-              <a:ln w="38100">
-                <a:solidFill>
-                  <a:schemeClr val="tx1"/>
-                </a:solidFill>
-              </a:ln>
-            </p:spPr>
-            <p:style>
-              <a:lnRef idx="2">
-                <a:schemeClr val="accent1">
-                  <a:shade val="50000"/>
-                </a:schemeClr>
-              </a:lnRef>
-              <a:fillRef idx="1">
-                <a:schemeClr val="accent1"/>
-              </a:fillRef>
-              <a:effectRef idx="0">
-                <a:schemeClr val="accent1"/>
-              </a:effectRef>
-              <a:fontRef idx="minor">
-                <a:schemeClr val="lt1"/>
-              </a:fontRef>
-            </p:style>
-            <p:txBody>
-              <a:bodyPr rtlCol="0" anchor="ctr"/>
-              <a:lstStyle/>
-              <a:p>
-                <a:pPr algn="ctr"/>
-                <a:endParaRPr lang="en-CA"/>
-              </a:p>
-            </p:txBody>
-          </p:sp>
-          <p:sp>
-            <p:nvSpPr>
-              <p:cNvPr id="9" name="Oval 8"/>
-              <p:cNvSpPr/>
-              <p:nvPr/>
-            </p:nvSpPr>
-            <p:spPr>
-              <a:xfrm>
-                <a:off x="3100251" y="4962754"/>
-                <a:ext cx="635726" cy="609605"/>
-              </a:xfrm>
-              <a:prstGeom prst="ellipse">
-                <a:avLst/>
-              </a:prstGeom>
-              <a:noFill/>
-              <a:ln w="38100">
-                <a:solidFill>
-                  <a:schemeClr val="tx1"/>
-                </a:solidFill>
-              </a:ln>
-            </p:spPr>
-            <p:style>
-              <a:lnRef idx="2">
-                <a:schemeClr val="accent1">
-                  <a:shade val="50000"/>
-                </a:schemeClr>
-              </a:lnRef>
-              <a:fillRef idx="1">
-                <a:schemeClr val="accent1"/>
-              </a:fillRef>
-              <a:effectRef idx="0">
-                <a:schemeClr val="accent1"/>
-              </a:effectRef>
-              <a:fontRef idx="minor">
-                <a:schemeClr val="lt1"/>
-              </a:fontRef>
-            </p:style>
-            <p:txBody>
-              <a:bodyPr rtlCol="0" anchor="ctr"/>
-              <a:lstStyle/>
-              <a:p>
-                <a:pPr algn="ctr"/>
-                <a:endParaRPr lang="en-CA"/>
-              </a:p>
-            </p:txBody>
-          </p:sp>
-          <p:sp>
-            <p:nvSpPr>
-              <p:cNvPr id="10" name="Oval 9"/>
-              <p:cNvSpPr/>
-              <p:nvPr/>
-            </p:nvSpPr>
-            <p:spPr>
-              <a:xfrm>
-                <a:off x="3371306" y="3476484"/>
-                <a:ext cx="93616" cy="89985"/>
-              </a:xfrm>
-              <a:prstGeom prst="ellipse">
-                <a:avLst/>
-              </a:prstGeom>
-              <a:solidFill>
-                <a:schemeClr val="tx1"/>
-              </a:solidFill>
-              <a:ln w="38100">
-                <a:solidFill>
-                  <a:schemeClr val="tx1"/>
-                </a:solidFill>
-              </a:ln>
-            </p:spPr>
-            <p:style>
-              <a:lnRef idx="2">
-                <a:schemeClr val="accent1">
-                  <a:shade val="50000"/>
-                </a:schemeClr>
-              </a:lnRef>
-              <a:fillRef idx="1">
-                <a:schemeClr val="accent1"/>
-              </a:fillRef>
-              <a:effectRef idx="0">
-                <a:schemeClr val="accent1"/>
-              </a:effectRef>
-              <a:fontRef idx="minor">
-                <a:schemeClr val="lt1"/>
-              </a:fontRef>
-            </p:style>
-            <p:txBody>
-              <a:bodyPr rtlCol="0" anchor="ctr"/>
-              <a:lstStyle/>
-              <a:p>
-                <a:pPr algn="ctr"/>
-                <a:endParaRPr lang="en-CA"/>
-              </a:p>
-            </p:txBody>
-          </p:sp>
-          <p:sp>
-            <p:nvSpPr>
-              <p:cNvPr id="11" name="Oval 10"/>
-              <p:cNvSpPr/>
-              <p:nvPr/>
-            </p:nvSpPr>
-            <p:spPr>
-              <a:xfrm>
-                <a:off x="3371306" y="3709450"/>
-                <a:ext cx="93616" cy="89985"/>
-              </a:xfrm>
-              <a:prstGeom prst="ellipse">
-                <a:avLst/>
-              </a:prstGeom>
-              <a:solidFill>
-                <a:schemeClr val="tx1"/>
-              </a:solidFill>
-              <a:ln w="38100">
-                <a:solidFill>
-                  <a:schemeClr val="tx1"/>
-                </a:solidFill>
-              </a:ln>
-            </p:spPr>
-            <p:style>
-              <a:lnRef idx="2">
-                <a:schemeClr val="accent1">
-                  <a:shade val="50000"/>
-                </a:schemeClr>
-              </a:lnRef>
-              <a:fillRef idx="1">
-                <a:schemeClr val="accent1"/>
-              </a:fillRef>
-              <a:effectRef idx="0">
-                <a:schemeClr val="accent1"/>
-              </a:effectRef>
-              <a:fontRef idx="minor">
-                <a:schemeClr val="lt1"/>
-              </a:fontRef>
-            </p:style>
-            <p:txBody>
-              <a:bodyPr rtlCol="0" anchor="ctr"/>
-              <a:lstStyle/>
-              <a:p>
-                <a:pPr algn="ctr"/>
-                <a:endParaRPr lang="en-CA"/>
-              </a:p>
-            </p:txBody>
-          </p:sp>
-          <p:sp>
-            <p:nvSpPr>
-              <p:cNvPr id="12" name="Oval 11"/>
-              <p:cNvSpPr/>
-              <p:nvPr/>
-            </p:nvSpPr>
-            <p:spPr>
-              <a:xfrm>
-                <a:off x="3371306" y="3932419"/>
-                <a:ext cx="93616" cy="89985"/>
-              </a:xfrm>
-              <a:prstGeom prst="ellipse">
-                <a:avLst/>
-              </a:prstGeom>
-              <a:solidFill>
-                <a:schemeClr val="tx1"/>
-              </a:solidFill>
-              <a:ln w="38100">
-                <a:solidFill>
-                  <a:schemeClr val="tx1"/>
-                </a:solidFill>
-              </a:ln>
-            </p:spPr>
-            <p:style>
-              <a:lnRef idx="2">
-                <a:schemeClr val="accent1">
-                  <a:shade val="50000"/>
-                </a:schemeClr>
-              </a:lnRef>
-              <a:fillRef idx="1">
-                <a:schemeClr val="accent1"/>
-              </a:fillRef>
-              <a:effectRef idx="0">
-                <a:schemeClr val="accent1"/>
-              </a:effectRef>
-              <a:fontRef idx="minor">
-                <a:schemeClr val="lt1"/>
-              </a:fontRef>
-            </p:style>
-            <p:txBody>
-              <a:bodyPr rtlCol="0" anchor="ctr"/>
-              <a:lstStyle/>
-              <a:p>
-                <a:pPr algn="ctr"/>
-                <a:endParaRPr lang="en-CA"/>
-              </a:p>
-            </p:txBody>
-          </p:sp>
+            </p:grpSpPr>
+            <p:sp>
+              <p:nvSpPr>
+                <p:cNvPr id="62" name="Rectangle 61"/>
+                <p:cNvSpPr/>
+                <p:nvPr/>
+              </p:nvSpPr>
+              <p:spPr>
+                <a:xfrm>
+                  <a:off x="7005228" y="4141960"/>
+                  <a:ext cx="1049898" cy="723616"/>
+                </a:xfrm>
+                <a:prstGeom prst="rect">
+                  <a:avLst/>
+                </a:prstGeom>
+                <a:noFill/>
+                <a:ln w="57150">
+                  <a:solidFill>
+                    <a:schemeClr val="tx1"/>
+                  </a:solidFill>
+                </a:ln>
+              </p:spPr>
+              <p:style>
+                <a:lnRef idx="2">
+                  <a:schemeClr val="accent1">
+                    <a:shade val="50000"/>
+                  </a:schemeClr>
+                </a:lnRef>
+                <a:fillRef idx="1">
+                  <a:schemeClr val="accent1"/>
+                </a:fillRef>
+                <a:effectRef idx="0">
+                  <a:schemeClr val="accent1"/>
+                </a:effectRef>
+                <a:fontRef idx="minor">
+                  <a:schemeClr val="lt1"/>
+                </a:fontRef>
+              </p:style>
+              <p:txBody>
+                <a:bodyPr rtlCol="0" anchor="ctr"/>
+                <a:lstStyle/>
+                <a:p>
+                  <a:pPr algn="ctr"/>
+                  <a:endParaRPr lang="en-CA"/>
+                </a:p>
+              </p:txBody>
+            </p:sp>
+            <p:sp>
+              <p:nvSpPr>
+                <p:cNvPr id="38" name="TextBox 37"/>
+                <p:cNvSpPr txBox="1"/>
+                <p:nvPr/>
+              </p:nvSpPr>
+              <p:spPr>
+                <a:xfrm>
+                  <a:off x="6967819" y="4149824"/>
+                  <a:ext cx="1160167" cy="646331"/>
+                </a:xfrm>
+                <a:prstGeom prst="rect">
+                  <a:avLst/>
+                </a:prstGeom>
+                <a:noFill/>
+              </p:spPr>
+              <p:txBody>
+                <a:bodyPr wrap="square" rtlCol="0">
+                  <a:spAutoFit/>
+                </a:bodyPr>
+                <a:lstStyle/>
+                <a:p>
+                  <a:pPr algn="ctr"/>
+                  <a:r>
+                    <a:rPr lang="en-CA" dirty="0" smtClean="0"/>
+                    <a:t>Subtract 0.5</a:t>
+                  </a:r>
+                  <a:endParaRPr lang="en-CA" dirty="0"/>
+                </a:p>
+              </p:txBody>
+            </p:sp>
+          </p:grpSp>
         </p:grpSp>
-        <p:sp>
-          <p:nvSpPr>
-            <p:cNvPr id="13" name="TextBox 12"/>
-            <p:cNvSpPr txBox="1"/>
-            <p:nvPr/>
-          </p:nvSpPr>
-          <p:spPr>
-            <a:xfrm>
-              <a:off x="2657203" y="1161014"/>
-              <a:ext cx="1428206" cy="830997"/>
-            </a:xfrm>
-            <a:prstGeom prst="rect">
-              <a:avLst/>
-            </a:prstGeom>
-            <a:noFill/>
-          </p:spPr>
-          <p:txBody>
-            <a:bodyPr wrap="square" rtlCol="0">
-              <a:spAutoFit/>
-            </a:bodyPr>
-            <a:lstStyle/>
-            <a:p>
-              <a:r>
-                <a:rPr lang="en-CA" sz="2400" dirty="0" smtClean="0"/>
-                <a:t>102 input nodes</a:t>
-              </a:r>
-              <a:endParaRPr lang="en-CA" sz="2400" dirty="0"/>
-            </a:p>
-          </p:txBody>
-        </p:sp>
-        <p:grpSp>
-          <p:nvGrpSpPr>
-            <p:cNvPr id="15" name="Group 14"/>
-            <p:cNvGrpSpPr/>
-            <p:nvPr/>
-          </p:nvGrpSpPr>
-          <p:grpSpPr>
-            <a:xfrm>
-              <a:off x="5047707" y="1997471"/>
-              <a:ext cx="635726" cy="3578101"/>
-              <a:chOff x="3100251" y="1994258"/>
-              <a:chExt cx="635726" cy="3578101"/>
-            </a:xfrm>
-          </p:grpSpPr>
-          <p:sp>
-            <p:nvSpPr>
-              <p:cNvPr id="16" name="Oval 15"/>
-              <p:cNvSpPr/>
-              <p:nvPr/>
-            </p:nvSpPr>
-            <p:spPr>
-              <a:xfrm>
-                <a:off x="3100251" y="1994258"/>
-                <a:ext cx="635726" cy="609605"/>
-              </a:xfrm>
-              <a:prstGeom prst="ellipse">
-                <a:avLst/>
-              </a:prstGeom>
-              <a:noFill/>
-              <a:ln w="38100">
-                <a:solidFill>
-                  <a:schemeClr val="tx1"/>
-                </a:solidFill>
-              </a:ln>
-            </p:spPr>
-            <p:style>
-              <a:lnRef idx="2">
-                <a:schemeClr val="accent1">
-                  <a:shade val="50000"/>
-                </a:schemeClr>
-              </a:lnRef>
-              <a:fillRef idx="1">
-                <a:schemeClr val="accent1"/>
-              </a:fillRef>
-              <a:effectRef idx="0">
-                <a:schemeClr val="accent1"/>
-              </a:effectRef>
-              <a:fontRef idx="minor">
-                <a:schemeClr val="lt1"/>
-              </a:fontRef>
-            </p:style>
-            <p:txBody>
-              <a:bodyPr rtlCol="0" anchor="ctr"/>
-              <a:lstStyle/>
-              <a:p>
-                <a:pPr algn="ctr"/>
-                <a:endParaRPr lang="en-CA"/>
-              </a:p>
-            </p:txBody>
-          </p:sp>
-          <p:sp>
-            <p:nvSpPr>
-              <p:cNvPr id="17" name="Oval 16"/>
-              <p:cNvSpPr/>
-              <p:nvPr/>
-            </p:nvSpPr>
-            <p:spPr>
-              <a:xfrm>
-                <a:off x="3100251" y="2715943"/>
-                <a:ext cx="635726" cy="609605"/>
-              </a:xfrm>
-              <a:prstGeom prst="ellipse">
-                <a:avLst/>
-              </a:prstGeom>
-              <a:noFill/>
-              <a:ln w="38100">
-                <a:solidFill>
-                  <a:schemeClr val="tx1"/>
-                </a:solidFill>
-              </a:ln>
-            </p:spPr>
-            <p:style>
-              <a:lnRef idx="2">
-                <a:schemeClr val="accent1">
-                  <a:shade val="50000"/>
-                </a:schemeClr>
-              </a:lnRef>
-              <a:fillRef idx="1">
-                <a:schemeClr val="accent1"/>
-              </a:fillRef>
-              <a:effectRef idx="0">
-                <a:schemeClr val="accent1"/>
-              </a:effectRef>
-              <a:fontRef idx="minor">
-                <a:schemeClr val="lt1"/>
-              </a:fontRef>
-            </p:style>
-            <p:txBody>
-              <a:bodyPr rtlCol="0" anchor="ctr"/>
-              <a:lstStyle/>
-              <a:p>
-                <a:pPr algn="ctr"/>
-                <a:endParaRPr lang="en-CA"/>
-              </a:p>
-            </p:txBody>
-          </p:sp>
-          <p:sp>
-            <p:nvSpPr>
-              <p:cNvPr id="18" name="Oval 17"/>
-              <p:cNvSpPr/>
-              <p:nvPr/>
-            </p:nvSpPr>
-            <p:spPr>
-              <a:xfrm>
-                <a:off x="3100251" y="4183337"/>
-                <a:ext cx="635726" cy="609605"/>
-              </a:xfrm>
-              <a:prstGeom prst="ellipse">
-                <a:avLst/>
-              </a:prstGeom>
-              <a:noFill/>
-              <a:ln w="38100">
-                <a:solidFill>
-                  <a:schemeClr val="tx1"/>
-                </a:solidFill>
-              </a:ln>
-            </p:spPr>
-            <p:style>
-              <a:lnRef idx="2">
-                <a:schemeClr val="accent1">
-                  <a:shade val="50000"/>
-                </a:schemeClr>
-              </a:lnRef>
-              <a:fillRef idx="1">
-                <a:schemeClr val="accent1"/>
-              </a:fillRef>
-              <a:effectRef idx="0">
-                <a:schemeClr val="accent1"/>
-              </a:effectRef>
-              <a:fontRef idx="minor">
-                <a:schemeClr val="lt1"/>
-              </a:fontRef>
-            </p:style>
-            <p:txBody>
-              <a:bodyPr rtlCol="0" anchor="ctr"/>
-              <a:lstStyle/>
-              <a:p>
-                <a:pPr algn="ctr"/>
-                <a:endParaRPr lang="en-CA"/>
-              </a:p>
-            </p:txBody>
-          </p:sp>
-          <p:sp>
-            <p:nvSpPr>
-              <p:cNvPr id="19" name="Oval 18"/>
-              <p:cNvSpPr/>
-              <p:nvPr/>
-            </p:nvSpPr>
-            <p:spPr>
-              <a:xfrm>
-                <a:off x="3100251" y="4962754"/>
-                <a:ext cx="635726" cy="609605"/>
-              </a:xfrm>
-              <a:prstGeom prst="ellipse">
-                <a:avLst/>
-              </a:prstGeom>
-              <a:noFill/>
-              <a:ln w="38100">
-                <a:solidFill>
-                  <a:schemeClr val="tx1"/>
-                </a:solidFill>
-              </a:ln>
-            </p:spPr>
-            <p:style>
-              <a:lnRef idx="2">
-                <a:schemeClr val="accent1">
-                  <a:shade val="50000"/>
-                </a:schemeClr>
-              </a:lnRef>
-              <a:fillRef idx="1">
-                <a:schemeClr val="accent1"/>
-              </a:fillRef>
-              <a:effectRef idx="0">
-                <a:schemeClr val="accent1"/>
-              </a:effectRef>
-              <a:fontRef idx="minor">
-                <a:schemeClr val="lt1"/>
-              </a:fontRef>
-            </p:style>
-            <p:txBody>
-              <a:bodyPr rtlCol="0" anchor="ctr"/>
-              <a:lstStyle/>
-              <a:p>
-                <a:pPr algn="ctr"/>
-                <a:endParaRPr lang="en-CA"/>
-              </a:p>
-            </p:txBody>
-          </p:sp>
-          <p:sp>
-            <p:nvSpPr>
-              <p:cNvPr id="20" name="Oval 19"/>
-              <p:cNvSpPr/>
-              <p:nvPr/>
-            </p:nvSpPr>
-            <p:spPr>
-              <a:xfrm>
-                <a:off x="3371306" y="3476484"/>
-                <a:ext cx="93616" cy="89985"/>
-              </a:xfrm>
-              <a:prstGeom prst="ellipse">
-                <a:avLst/>
-              </a:prstGeom>
-              <a:solidFill>
-                <a:schemeClr val="tx1"/>
-              </a:solidFill>
-              <a:ln w="38100">
-                <a:solidFill>
-                  <a:schemeClr val="tx1"/>
-                </a:solidFill>
-              </a:ln>
-            </p:spPr>
-            <p:style>
-              <a:lnRef idx="2">
-                <a:schemeClr val="accent1">
-                  <a:shade val="50000"/>
-                </a:schemeClr>
-              </a:lnRef>
-              <a:fillRef idx="1">
-                <a:schemeClr val="accent1"/>
-              </a:fillRef>
-              <a:effectRef idx="0">
-                <a:schemeClr val="accent1"/>
-              </a:effectRef>
-              <a:fontRef idx="minor">
-                <a:schemeClr val="lt1"/>
-              </a:fontRef>
-            </p:style>
-            <p:txBody>
-              <a:bodyPr rtlCol="0" anchor="ctr"/>
-              <a:lstStyle/>
-              <a:p>
-                <a:pPr algn="ctr"/>
-                <a:endParaRPr lang="en-CA"/>
-              </a:p>
-            </p:txBody>
-          </p:sp>
-          <p:sp>
-            <p:nvSpPr>
-              <p:cNvPr id="21" name="Oval 20"/>
-              <p:cNvSpPr/>
-              <p:nvPr/>
-            </p:nvSpPr>
-            <p:spPr>
-              <a:xfrm>
-                <a:off x="3371306" y="3709450"/>
-                <a:ext cx="93616" cy="89985"/>
-              </a:xfrm>
-              <a:prstGeom prst="ellipse">
-                <a:avLst/>
-              </a:prstGeom>
-              <a:solidFill>
-                <a:schemeClr val="tx1"/>
-              </a:solidFill>
-              <a:ln w="38100">
-                <a:solidFill>
-                  <a:schemeClr val="tx1"/>
-                </a:solidFill>
-              </a:ln>
-            </p:spPr>
-            <p:style>
-              <a:lnRef idx="2">
-                <a:schemeClr val="accent1">
-                  <a:shade val="50000"/>
-                </a:schemeClr>
-              </a:lnRef>
-              <a:fillRef idx="1">
-                <a:schemeClr val="accent1"/>
-              </a:fillRef>
-              <a:effectRef idx="0">
-                <a:schemeClr val="accent1"/>
-              </a:effectRef>
-              <a:fontRef idx="minor">
-                <a:schemeClr val="lt1"/>
-              </a:fontRef>
-            </p:style>
-            <p:txBody>
-              <a:bodyPr rtlCol="0" anchor="ctr"/>
-              <a:lstStyle/>
-              <a:p>
-                <a:pPr algn="ctr"/>
-                <a:endParaRPr lang="en-CA"/>
-              </a:p>
-            </p:txBody>
-          </p:sp>
-          <p:sp>
-            <p:nvSpPr>
-              <p:cNvPr id="22" name="Oval 21"/>
-              <p:cNvSpPr/>
-              <p:nvPr/>
-            </p:nvSpPr>
-            <p:spPr>
-              <a:xfrm>
-                <a:off x="3371306" y="3932419"/>
-                <a:ext cx="93616" cy="89985"/>
-              </a:xfrm>
-              <a:prstGeom prst="ellipse">
-                <a:avLst/>
-              </a:prstGeom>
-              <a:solidFill>
-                <a:schemeClr val="tx1"/>
-              </a:solidFill>
-              <a:ln w="38100">
-                <a:solidFill>
-                  <a:schemeClr val="tx1"/>
-                </a:solidFill>
-              </a:ln>
-            </p:spPr>
-            <p:style>
-              <a:lnRef idx="2">
-                <a:schemeClr val="accent1">
-                  <a:shade val="50000"/>
-                </a:schemeClr>
-              </a:lnRef>
-              <a:fillRef idx="1">
-                <a:schemeClr val="accent1"/>
-              </a:fillRef>
-              <a:effectRef idx="0">
-                <a:schemeClr val="accent1"/>
-              </a:effectRef>
-              <a:fontRef idx="minor">
-                <a:schemeClr val="lt1"/>
-              </a:fontRef>
-            </p:style>
-            <p:txBody>
-              <a:bodyPr rtlCol="0" anchor="ctr"/>
-              <a:lstStyle/>
-              <a:p>
-                <a:pPr algn="ctr"/>
-                <a:endParaRPr lang="en-CA"/>
-              </a:p>
-            </p:txBody>
-          </p:sp>
-        </p:grpSp>
-        <p:sp>
-          <p:nvSpPr>
-            <p:cNvPr id="23" name="Oval 22"/>
-            <p:cNvSpPr/>
-            <p:nvPr/>
-          </p:nvSpPr>
-          <p:spPr>
-            <a:xfrm>
-              <a:off x="6891746" y="3194587"/>
-              <a:ext cx="853440" cy="857789"/>
-            </a:xfrm>
-            <a:prstGeom prst="ellipse">
-              <a:avLst/>
-            </a:prstGeom>
-            <a:noFill/>
-            <a:ln w="38100">
-              <a:solidFill>
-                <a:schemeClr val="tx1"/>
-              </a:solidFill>
-            </a:ln>
-          </p:spPr>
-          <p:style>
-            <a:lnRef idx="2">
-              <a:schemeClr val="accent1">
-                <a:shade val="50000"/>
-              </a:schemeClr>
-            </a:lnRef>
-            <a:fillRef idx="1">
-              <a:schemeClr val="accent1"/>
-            </a:fillRef>
-            <a:effectRef idx="0">
-              <a:schemeClr val="accent1"/>
-            </a:effectRef>
-            <a:fontRef idx="minor">
-              <a:schemeClr val="lt1"/>
-            </a:fontRef>
-          </p:style>
-          <p:txBody>
-            <a:bodyPr rtlCol="0" anchor="ctr"/>
-            <a:lstStyle/>
-            <a:p>
-              <a:pPr algn="ctr"/>
-              <a:endParaRPr lang="en-CA"/>
-            </a:p>
-          </p:txBody>
-        </p:sp>
-        <p:sp>
-          <p:nvSpPr>
-            <p:cNvPr id="24" name="TextBox 23"/>
-            <p:cNvSpPr txBox="1"/>
-            <p:nvPr/>
-          </p:nvSpPr>
-          <p:spPr>
-            <a:xfrm>
-              <a:off x="4657999" y="1187141"/>
-              <a:ext cx="1536245" cy="830997"/>
-            </a:xfrm>
-            <a:prstGeom prst="rect">
-              <a:avLst/>
-            </a:prstGeom>
-            <a:noFill/>
-          </p:spPr>
-          <p:txBody>
-            <a:bodyPr wrap="square" rtlCol="0">
-              <a:spAutoFit/>
-            </a:bodyPr>
-            <a:lstStyle/>
-            <a:p>
-              <a:r>
-                <a:rPr lang="en-CA" sz="2400" dirty="0" smtClean="0"/>
-                <a:t>10 hidden nodes</a:t>
-              </a:r>
-              <a:endParaRPr lang="en-CA" sz="2400" dirty="0"/>
-            </a:p>
-          </p:txBody>
-        </p:sp>
-        <p:sp>
-          <p:nvSpPr>
-            <p:cNvPr id="25" name="TextBox 24"/>
-            <p:cNvSpPr txBox="1"/>
-            <p:nvPr/>
-          </p:nvSpPr>
-          <p:spPr>
-            <a:xfrm>
-              <a:off x="6766834" y="1207923"/>
-              <a:ext cx="1536245" cy="830997"/>
-            </a:xfrm>
-            <a:prstGeom prst="rect">
-              <a:avLst/>
-            </a:prstGeom>
-            <a:noFill/>
-          </p:spPr>
-          <p:txBody>
-            <a:bodyPr wrap="square" rtlCol="0">
-              <a:spAutoFit/>
-            </a:bodyPr>
-            <a:lstStyle/>
-            <a:p>
-              <a:r>
-                <a:rPr lang="en-CA" sz="2400" dirty="0" smtClean="0"/>
-                <a:t>1 output node</a:t>
-              </a:r>
-              <a:endParaRPr lang="en-CA" sz="2400" dirty="0"/>
-            </a:p>
-          </p:txBody>
-        </p:sp>
         <p:cxnSp>
           <p:nvCxnSpPr>
-            <p:cNvPr id="27" name="Straight Arrow Connector 26"/>
-            <p:cNvCxnSpPr>
-              <a:stCxn id="4" idx="3"/>
-              <a:endCxn id="6" idx="2"/>
-            </p:cNvCxnSpPr>
+            <p:cNvPr id="68" name="Straight Arrow Connector 67"/>
+            <p:cNvCxnSpPr/>
             <p:nvPr/>
           </p:nvCxnSpPr>
           <p:spPr>
             <a:xfrm flipV="1">
-              <a:off x="1861459" y="2299061"/>
-              <a:ext cx="1238792" cy="1026487"/>
-            </a:xfrm>
-            <a:prstGeom prst="straightConnector1">
-              <a:avLst/>
-            </a:prstGeom>
-            <a:ln w="28575">
-              <a:solidFill>
-                <a:schemeClr val="tx1"/>
-              </a:solidFill>
-              <a:tailEnd type="triangle"/>
-            </a:ln>
-          </p:spPr>
-          <p:style>
-            <a:lnRef idx="1">
-              <a:schemeClr val="accent1"/>
-            </a:lnRef>
-            <a:fillRef idx="0">
-              <a:schemeClr val="accent1"/>
-            </a:fillRef>
-            <a:effectRef idx="0">
-              <a:schemeClr val="accent1"/>
-            </a:effectRef>
-            <a:fontRef idx="minor">
-              <a:schemeClr val="tx1"/>
-            </a:fontRef>
-          </p:style>
-        </p:cxnSp>
-        <p:cxnSp>
-          <p:nvCxnSpPr>
-            <p:cNvPr id="29" name="Straight Arrow Connector 28"/>
-            <p:cNvCxnSpPr>
-              <a:stCxn id="4" idx="3"/>
-              <a:endCxn id="7" idx="2"/>
-            </p:cNvCxnSpPr>
-            <p:nvPr/>
-          </p:nvCxnSpPr>
-          <p:spPr>
-            <a:xfrm flipV="1">
-              <a:off x="1861459" y="3020746"/>
-              <a:ext cx="1238792" cy="304802"/>
-            </a:xfrm>
-            <a:prstGeom prst="straightConnector1">
-              <a:avLst/>
-            </a:prstGeom>
-            <a:ln w="28575">
-              <a:solidFill>
-                <a:schemeClr val="tx1"/>
-              </a:solidFill>
-              <a:tailEnd type="triangle"/>
-            </a:ln>
-          </p:spPr>
-          <p:style>
-            <a:lnRef idx="1">
-              <a:schemeClr val="accent1"/>
-            </a:lnRef>
-            <a:fillRef idx="0">
-              <a:schemeClr val="accent1"/>
-            </a:fillRef>
-            <a:effectRef idx="0">
-              <a:schemeClr val="accent1"/>
-            </a:effectRef>
-            <a:fontRef idx="minor">
-              <a:schemeClr val="tx1"/>
-            </a:fontRef>
-          </p:style>
-        </p:cxnSp>
-        <p:cxnSp>
-          <p:nvCxnSpPr>
-            <p:cNvPr id="31" name="Straight Arrow Connector 30"/>
-            <p:cNvCxnSpPr>
-              <a:stCxn id="4" idx="3"/>
-              <a:endCxn id="8" idx="2"/>
-            </p:cNvCxnSpPr>
-            <p:nvPr/>
-          </p:nvCxnSpPr>
-          <p:spPr>
-            <a:xfrm>
-              <a:off x="1861459" y="3325548"/>
-              <a:ext cx="1238792" cy="1162592"/>
-            </a:xfrm>
-            <a:prstGeom prst="straightConnector1">
-              <a:avLst/>
-            </a:prstGeom>
-            <a:ln w="28575">
-              <a:solidFill>
-                <a:schemeClr val="tx1"/>
-              </a:solidFill>
-              <a:tailEnd type="triangle"/>
-            </a:ln>
-          </p:spPr>
-          <p:style>
-            <a:lnRef idx="1">
-              <a:schemeClr val="accent1"/>
-            </a:lnRef>
-            <a:fillRef idx="0">
-              <a:schemeClr val="accent1"/>
-            </a:fillRef>
-            <a:effectRef idx="0">
-              <a:schemeClr val="accent1"/>
-            </a:effectRef>
-            <a:fontRef idx="minor">
-              <a:schemeClr val="tx1"/>
-            </a:fontRef>
-          </p:style>
-        </p:cxnSp>
-        <p:cxnSp>
-          <p:nvCxnSpPr>
-            <p:cNvPr id="33" name="Straight Arrow Connector 32"/>
-            <p:cNvCxnSpPr>
-              <a:stCxn id="4" idx="3"/>
-              <a:endCxn id="9" idx="2"/>
-            </p:cNvCxnSpPr>
-            <p:nvPr/>
-          </p:nvCxnSpPr>
-          <p:spPr>
-            <a:xfrm>
-              <a:off x="1861459" y="3325548"/>
-              <a:ext cx="1238792" cy="1942009"/>
-            </a:xfrm>
-            <a:prstGeom prst="straightConnector1">
-              <a:avLst/>
-            </a:prstGeom>
-            <a:ln w="28575">
-              <a:solidFill>
-                <a:schemeClr val="tx1"/>
-              </a:solidFill>
-              <a:tailEnd type="triangle"/>
-            </a:ln>
-          </p:spPr>
-          <p:style>
-            <a:lnRef idx="1">
-              <a:schemeClr val="accent1"/>
-            </a:lnRef>
-            <a:fillRef idx="0">
-              <a:schemeClr val="accent1"/>
-            </a:fillRef>
-            <a:effectRef idx="0">
-              <a:schemeClr val="accent1"/>
-            </a:effectRef>
-            <a:fontRef idx="minor">
-              <a:schemeClr val="tx1"/>
-            </a:fontRef>
-          </p:style>
-        </p:cxnSp>
-        <p:cxnSp>
-          <p:nvCxnSpPr>
-            <p:cNvPr id="35" name="Straight Arrow Connector 34"/>
-            <p:cNvCxnSpPr>
-              <a:stCxn id="6" idx="6"/>
-              <a:endCxn id="16" idx="2"/>
-            </p:cNvCxnSpPr>
-            <p:nvPr/>
-          </p:nvCxnSpPr>
-          <p:spPr>
-            <a:xfrm>
-              <a:off x="3735977" y="2299061"/>
-              <a:ext cx="1311730" cy="3213"/>
-            </a:xfrm>
-            <a:prstGeom prst="straightConnector1">
-              <a:avLst/>
-            </a:prstGeom>
-            <a:ln w="28575">
-              <a:solidFill>
-                <a:schemeClr val="tx1"/>
-              </a:solidFill>
-              <a:tailEnd type="triangle"/>
-            </a:ln>
-          </p:spPr>
-          <p:style>
-            <a:lnRef idx="1">
-              <a:schemeClr val="accent1"/>
-            </a:lnRef>
-            <a:fillRef idx="0">
-              <a:schemeClr val="accent1"/>
-            </a:fillRef>
-            <a:effectRef idx="0">
-              <a:schemeClr val="accent1"/>
-            </a:effectRef>
-            <a:fontRef idx="minor">
-              <a:schemeClr val="tx1"/>
-            </a:fontRef>
-          </p:style>
-        </p:cxnSp>
-        <p:cxnSp>
-          <p:nvCxnSpPr>
-            <p:cNvPr id="37" name="Straight Arrow Connector 36"/>
-            <p:cNvCxnSpPr>
-              <a:stCxn id="6" idx="6"/>
-              <a:endCxn id="17" idx="2"/>
-            </p:cNvCxnSpPr>
-            <p:nvPr/>
-          </p:nvCxnSpPr>
-          <p:spPr>
-            <a:xfrm>
-              <a:off x="3735977" y="2299061"/>
-              <a:ext cx="1311730" cy="724898"/>
-            </a:xfrm>
-            <a:prstGeom prst="straightConnector1">
-              <a:avLst/>
-            </a:prstGeom>
-            <a:ln w="28575">
-              <a:solidFill>
-                <a:schemeClr val="tx1"/>
-              </a:solidFill>
-              <a:tailEnd type="triangle"/>
-            </a:ln>
-          </p:spPr>
-          <p:style>
-            <a:lnRef idx="1">
-              <a:schemeClr val="accent1"/>
-            </a:lnRef>
-            <a:fillRef idx="0">
-              <a:schemeClr val="accent1"/>
-            </a:fillRef>
-            <a:effectRef idx="0">
-              <a:schemeClr val="accent1"/>
-            </a:effectRef>
-            <a:fontRef idx="minor">
-              <a:schemeClr val="tx1"/>
-            </a:fontRef>
-          </p:style>
-        </p:cxnSp>
-        <p:cxnSp>
-          <p:nvCxnSpPr>
-            <p:cNvPr id="39" name="Straight Arrow Connector 38"/>
-            <p:cNvCxnSpPr>
-              <a:stCxn id="6" idx="6"/>
-              <a:endCxn id="18" idx="2"/>
-            </p:cNvCxnSpPr>
-            <p:nvPr/>
-          </p:nvCxnSpPr>
-          <p:spPr>
-            <a:xfrm>
-              <a:off x="3735977" y="2299061"/>
-              <a:ext cx="1311730" cy="2192292"/>
-            </a:xfrm>
-            <a:prstGeom prst="straightConnector1">
-              <a:avLst/>
-            </a:prstGeom>
-            <a:ln w="28575">
-              <a:solidFill>
-                <a:schemeClr val="tx1"/>
-              </a:solidFill>
-              <a:tailEnd type="triangle"/>
-            </a:ln>
-          </p:spPr>
-          <p:style>
-            <a:lnRef idx="1">
-              <a:schemeClr val="accent1"/>
-            </a:lnRef>
-            <a:fillRef idx="0">
-              <a:schemeClr val="accent1"/>
-            </a:fillRef>
-            <a:effectRef idx="0">
-              <a:schemeClr val="accent1"/>
-            </a:effectRef>
-            <a:fontRef idx="minor">
-              <a:schemeClr val="tx1"/>
-            </a:fontRef>
-          </p:style>
-        </p:cxnSp>
-        <p:cxnSp>
-          <p:nvCxnSpPr>
-            <p:cNvPr id="41" name="Straight Arrow Connector 40"/>
-            <p:cNvCxnSpPr>
-              <a:stCxn id="6" idx="6"/>
-              <a:endCxn id="19" idx="2"/>
-            </p:cNvCxnSpPr>
-            <p:nvPr/>
-          </p:nvCxnSpPr>
-          <p:spPr>
-            <a:xfrm>
-              <a:off x="3735977" y="2299061"/>
-              <a:ext cx="1311730" cy="2971709"/>
-            </a:xfrm>
-            <a:prstGeom prst="straightConnector1">
-              <a:avLst/>
-            </a:prstGeom>
-            <a:ln w="28575">
-              <a:solidFill>
-                <a:schemeClr val="tx1"/>
-              </a:solidFill>
-              <a:tailEnd type="triangle"/>
-            </a:ln>
-          </p:spPr>
-          <p:style>
-            <a:lnRef idx="1">
-              <a:schemeClr val="accent1"/>
-            </a:lnRef>
-            <a:fillRef idx="0">
-              <a:schemeClr val="accent1"/>
-            </a:fillRef>
-            <a:effectRef idx="0">
-              <a:schemeClr val="accent1"/>
-            </a:effectRef>
-            <a:fontRef idx="minor">
-              <a:schemeClr val="tx1"/>
-            </a:fontRef>
-          </p:style>
-        </p:cxnSp>
-        <p:cxnSp>
-          <p:nvCxnSpPr>
-            <p:cNvPr id="43" name="Straight Arrow Connector 42"/>
-            <p:cNvCxnSpPr>
-              <a:stCxn id="7" idx="6"/>
-              <a:endCxn id="16" idx="2"/>
-            </p:cNvCxnSpPr>
-            <p:nvPr/>
-          </p:nvCxnSpPr>
-          <p:spPr>
-            <a:xfrm flipV="1">
-              <a:off x="3735977" y="2302274"/>
-              <a:ext cx="1311730" cy="718472"/>
-            </a:xfrm>
-            <a:prstGeom prst="straightConnector1">
-              <a:avLst/>
-            </a:prstGeom>
-            <a:ln w="28575">
-              <a:solidFill>
-                <a:schemeClr val="tx1"/>
-              </a:solidFill>
-              <a:tailEnd type="triangle"/>
-            </a:ln>
-          </p:spPr>
-          <p:style>
-            <a:lnRef idx="1">
-              <a:schemeClr val="accent1"/>
-            </a:lnRef>
-            <a:fillRef idx="0">
-              <a:schemeClr val="accent1"/>
-            </a:fillRef>
-            <a:effectRef idx="0">
-              <a:schemeClr val="accent1"/>
-            </a:effectRef>
-            <a:fontRef idx="minor">
-              <a:schemeClr val="tx1"/>
-            </a:fontRef>
-          </p:style>
-        </p:cxnSp>
-        <p:cxnSp>
-          <p:nvCxnSpPr>
-            <p:cNvPr id="45" name="Straight Arrow Connector 44"/>
-            <p:cNvCxnSpPr>
-              <a:stCxn id="7" idx="6"/>
-              <a:endCxn id="17" idx="2"/>
-            </p:cNvCxnSpPr>
-            <p:nvPr/>
-          </p:nvCxnSpPr>
-          <p:spPr>
-            <a:xfrm>
-              <a:off x="3735977" y="3020746"/>
-              <a:ext cx="1311730" cy="3213"/>
-            </a:xfrm>
-            <a:prstGeom prst="straightConnector1">
-              <a:avLst/>
-            </a:prstGeom>
-            <a:ln w="28575">
-              <a:solidFill>
-                <a:schemeClr val="tx1"/>
-              </a:solidFill>
-              <a:tailEnd type="triangle"/>
-            </a:ln>
-          </p:spPr>
-          <p:style>
-            <a:lnRef idx="1">
-              <a:schemeClr val="accent1"/>
-            </a:lnRef>
-            <a:fillRef idx="0">
-              <a:schemeClr val="accent1"/>
-            </a:fillRef>
-            <a:effectRef idx="0">
-              <a:schemeClr val="accent1"/>
-            </a:effectRef>
-            <a:fontRef idx="minor">
-              <a:schemeClr val="tx1"/>
-            </a:fontRef>
-          </p:style>
-        </p:cxnSp>
-        <p:cxnSp>
-          <p:nvCxnSpPr>
-            <p:cNvPr id="47" name="Straight Arrow Connector 46"/>
-            <p:cNvCxnSpPr>
-              <a:stCxn id="7" idx="6"/>
-              <a:endCxn id="18" idx="2"/>
-            </p:cNvCxnSpPr>
-            <p:nvPr/>
-          </p:nvCxnSpPr>
-          <p:spPr>
-            <a:xfrm>
-              <a:off x="3735977" y="3020746"/>
-              <a:ext cx="1311730" cy="1470607"/>
-            </a:xfrm>
-            <a:prstGeom prst="straightConnector1">
-              <a:avLst/>
-            </a:prstGeom>
-            <a:ln w="28575">
-              <a:solidFill>
-                <a:schemeClr val="tx1"/>
-              </a:solidFill>
-              <a:tailEnd type="triangle"/>
-            </a:ln>
-          </p:spPr>
-          <p:style>
-            <a:lnRef idx="1">
-              <a:schemeClr val="accent1"/>
-            </a:lnRef>
-            <a:fillRef idx="0">
-              <a:schemeClr val="accent1"/>
-            </a:fillRef>
-            <a:effectRef idx="0">
-              <a:schemeClr val="accent1"/>
-            </a:effectRef>
-            <a:fontRef idx="minor">
-              <a:schemeClr val="tx1"/>
-            </a:fontRef>
-          </p:style>
-        </p:cxnSp>
-        <p:cxnSp>
-          <p:nvCxnSpPr>
-            <p:cNvPr id="49" name="Straight Arrow Connector 48"/>
-            <p:cNvCxnSpPr>
-              <a:stCxn id="7" idx="6"/>
-              <a:endCxn id="19" idx="2"/>
-            </p:cNvCxnSpPr>
-            <p:nvPr/>
-          </p:nvCxnSpPr>
-          <p:spPr>
-            <a:xfrm>
-              <a:off x="3735977" y="3020746"/>
-              <a:ext cx="1311730" cy="2250024"/>
-            </a:xfrm>
-            <a:prstGeom prst="straightConnector1">
-              <a:avLst/>
-            </a:prstGeom>
-            <a:ln w="28575">
-              <a:solidFill>
-                <a:schemeClr val="tx1"/>
-              </a:solidFill>
-              <a:tailEnd type="triangle"/>
-            </a:ln>
-          </p:spPr>
-          <p:style>
-            <a:lnRef idx="1">
-              <a:schemeClr val="accent1"/>
-            </a:lnRef>
-            <a:fillRef idx="0">
-              <a:schemeClr val="accent1"/>
-            </a:fillRef>
-            <a:effectRef idx="0">
-              <a:schemeClr val="accent1"/>
-            </a:effectRef>
-            <a:fontRef idx="minor">
-              <a:schemeClr val="tx1"/>
-            </a:fontRef>
-          </p:style>
-        </p:cxnSp>
-        <p:cxnSp>
-          <p:nvCxnSpPr>
-            <p:cNvPr id="51" name="Straight Arrow Connector 50"/>
-            <p:cNvCxnSpPr>
-              <a:stCxn id="8" idx="6"/>
-              <a:endCxn id="16" idx="2"/>
-            </p:cNvCxnSpPr>
-            <p:nvPr/>
-          </p:nvCxnSpPr>
-          <p:spPr>
-            <a:xfrm flipV="1">
-              <a:off x="3735977" y="2302274"/>
-              <a:ext cx="1311730" cy="2185866"/>
-            </a:xfrm>
-            <a:prstGeom prst="straightConnector1">
-              <a:avLst/>
-            </a:prstGeom>
-            <a:ln w="28575">
-              <a:solidFill>
-                <a:schemeClr val="tx1"/>
-              </a:solidFill>
-              <a:tailEnd type="triangle"/>
-            </a:ln>
-          </p:spPr>
-          <p:style>
-            <a:lnRef idx="1">
-              <a:schemeClr val="accent1"/>
-            </a:lnRef>
-            <a:fillRef idx="0">
-              <a:schemeClr val="accent1"/>
-            </a:fillRef>
-            <a:effectRef idx="0">
-              <a:schemeClr val="accent1"/>
-            </a:effectRef>
-            <a:fontRef idx="minor">
-              <a:schemeClr val="tx1"/>
-            </a:fontRef>
-          </p:style>
-        </p:cxnSp>
-        <p:cxnSp>
-          <p:nvCxnSpPr>
-            <p:cNvPr id="53" name="Straight Arrow Connector 52"/>
-            <p:cNvCxnSpPr>
-              <a:stCxn id="8" idx="6"/>
-              <a:endCxn id="17" idx="2"/>
-            </p:cNvCxnSpPr>
-            <p:nvPr/>
-          </p:nvCxnSpPr>
-          <p:spPr>
-            <a:xfrm flipV="1">
-              <a:off x="3735977" y="3023959"/>
-              <a:ext cx="1311730" cy="1464181"/>
-            </a:xfrm>
-            <a:prstGeom prst="straightConnector1">
-              <a:avLst/>
-            </a:prstGeom>
-            <a:ln w="28575">
-              <a:solidFill>
-                <a:schemeClr val="tx1"/>
-              </a:solidFill>
-              <a:tailEnd type="triangle"/>
-            </a:ln>
-          </p:spPr>
-          <p:style>
-            <a:lnRef idx="1">
-              <a:schemeClr val="accent1"/>
-            </a:lnRef>
-            <a:fillRef idx="0">
-              <a:schemeClr val="accent1"/>
-            </a:fillRef>
-            <a:effectRef idx="0">
-              <a:schemeClr val="accent1"/>
-            </a:effectRef>
-            <a:fontRef idx="minor">
-              <a:schemeClr val="tx1"/>
-            </a:fontRef>
-          </p:style>
-        </p:cxnSp>
-        <p:cxnSp>
-          <p:nvCxnSpPr>
-            <p:cNvPr id="55" name="Straight Arrow Connector 54"/>
-            <p:cNvCxnSpPr>
-              <a:stCxn id="8" idx="6"/>
-              <a:endCxn id="18" idx="2"/>
-            </p:cNvCxnSpPr>
-            <p:nvPr/>
-          </p:nvCxnSpPr>
-          <p:spPr>
-            <a:xfrm>
-              <a:off x="3735977" y="4488140"/>
-              <a:ext cx="1311730" cy="3213"/>
-            </a:xfrm>
-            <a:prstGeom prst="straightConnector1">
-              <a:avLst/>
-            </a:prstGeom>
-            <a:ln w="28575">
-              <a:solidFill>
-                <a:schemeClr val="tx1"/>
-              </a:solidFill>
-              <a:tailEnd type="triangle"/>
-            </a:ln>
-          </p:spPr>
-          <p:style>
-            <a:lnRef idx="1">
-              <a:schemeClr val="accent1"/>
-            </a:lnRef>
-            <a:fillRef idx="0">
-              <a:schemeClr val="accent1"/>
-            </a:fillRef>
-            <a:effectRef idx="0">
-              <a:schemeClr val="accent1"/>
-            </a:effectRef>
-            <a:fontRef idx="minor">
-              <a:schemeClr val="tx1"/>
-            </a:fontRef>
-          </p:style>
-        </p:cxnSp>
-        <p:cxnSp>
-          <p:nvCxnSpPr>
-            <p:cNvPr id="57" name="Straight Arrow Connector 56"/>
-            <p:cNvCxnSpPr>
-              <a:stCxn id="8" idx="6"/>
-              <a:endCxn id="19" idx="2"/>
-            </p:cNvCxnSpPr>
-            <p:nvPr/>
-          </p:nvCxnSpPr>
-          <p:spPr>
-            <a:xfrm>
-              <a:off x="3735977" y="4488140"/>
-              <a:ext cx="1311730" cy="782630"/>
-            </a:xfrm>
-            <a:prstGeom prst="straightConnector1">
-              <a:avLst/>
-            </a:prstGeom>
-            <a:ln w="28575">
-              <a:solidFill>
-                <a:schemeClr val="tx1"/>
-              </a:solidFill>
-              <a:tailEnd type="triangle"/>
-            </a:ln>
-          </p:spPr>
-          <p:style>
-            <a:lnRef idx="1">
-              <a:schemeClr val="accent1"/>
-            </a:lnRef>
-            <a:fillRef idx="0">
-              <a:schemeClr val="accent1"/>
-            </a:fillRef>
-            <a:effectRef idx="0">
-              <a:schemeClr val="accent1"/>
-            </a:effectRef>
-            <a:fontRef idx="minor">
-              <a:schemeClr val="tx1"/>
-            </a:fontRef>
-          </p:style>
-        </p:cxnSp>
-        <p:cxnSp>
-          <p:nvCxnSpPr>
-            <p:cNvPr id="59" name="Straight Arrow Connector 58"/>
-            <p:cNvCxnSpPr>
-              <a:stCxn id="9" idx="6"/>
-              <a:endCxn id="16" idx="2"/>
-            </p:cNvCxnSpPr>
-            <p:nvPr/>
-          </p:nvCxnSpPr>
-          <p:spPr>
-            <a:xfrm flipV="1">
-              <a:off x="3735977" y="2302274"/>
-              <a:ext cx="1311730" cy="2965283"/>
-            </a:xfrm>
-            <a:prstGeom prst="straightConnector1">
-              <a:avLst/>
-            </a:prstGeom>
-            <a:ln w="28575">
-              <a:solidFill>
-                <a:schemeClr val="tx1"/>
-              </a:solidFill>
-              <a:tailEnd type="triangle"/>
-            </a:ln>
-          </p:spPr>
-          <p:style>
-            <a:lnRef idx="1">
-              <a:schemeClr val="accent1"/>
-            </a:lnRef>
-            <a:fillRef idx="0">
-              <a:schemeClr val="accent1"/>
-            </a:fillRef>
-            <a:effectRef idx="0">
-              <a:schemeClr val="accent1"/>
-            </a:effectRef>
-            <a:fontRef idx="minor">
-              <a:schemeClr val="tx1"/>
-            </a:fontRef>
-          </p:style>
-        </p:cxnSp>
-        <p:cxnSp>
-          <p:nvCxnSpPr>
-            <p:cNvPr id="61" name="Straight Arrow Connector 60"/>
-            <p:cNvCxnSpPr>
-              <a:stCxn id="9" idx="6"/>
-              <a:endCxn id="17" idx="2"/>
-            </p:cNvCxnSpPr>
-            <p:nvPr/>
-          </p:nvCxnSpPr>
-          <p:spPr>
-            <a:xfrm flipV="1">
-              <a:off x="3735977" y="3023959"/>
-              <a:ext cx="1311730" cy="2243598"/>
-            </a:xfrm>
-            <a:prstGeom prst="straightConnector1">
-              <a:avLst/>
-            </a:prstGeom>
-            <a:ln w="28575">
-              <a:solidFill>
-                <a:schemeClr val="tx1"/>
-              </a:solidFill>
-              <a:tailEnd type="triangle"/>
-            </a:ln>
-          </p:spPr>
-          <p:style>
-            <a:lnRef idx="1">
-              <a:schemeClr val="accent1"/>
-            </a:lnRef>
-            <a:fillRef idx="0">
-              <a:schemeClr val="accent1"/>
-            </a:fillRef>
-            <a:effectRef idx="0">
-              <a:schemeClr val="accent1"/>
-            </a:effectRef>
-            <a:fontRef idx="minor">
-              <a:schemeClr val="tx1"/>
-            </a:fontRef>
-          </p:style>
-        </p:cxnSp>
-        <p:cxnSp>
-          <p:nvCxnSpPr>
-            <p:cNvPr id="63" name="Straight Arrow Connector 62"/>
-            <p:cNvCxnSpPr>
-              <a:stCxn id="9" idx="6"/>
-              <a:endCxn id="18" idx="2"/>
-            </p:cNvCxnSpPr>
-            <p:nvPr/>
-          </p:nvCxnSpPr>
-          <p:spPr>
-            <a:xfrm flipV="1">
-              <a:off x="3735977" y="4491353"/>
-              <a:ext cx="1311730" cy="776204"/>
-            </a:xfrm>
-            <a:prstGeom prst="straightConnector1">
-              <a:avLst/>
-            </a:prstGeom>
-            <a:ln w="28575">
-              <a:solidFill>
-                <a:schemeClr val="tx1"/>
-              </a:solidFill>
-              <a:tailEnd type="triangle"/>
-            </a:ln>
-          </p:spPr>
-          <p:style>
-            <a:lnRef idx="1">
-              <a:schemeClr val="accent1"/>
-            </a:lnRef>
-            <a:fillRef idx="0">
-              <a:schemeClr val="accent1"/>
-            </a:fillRef>
-            <a:effectRef idx="0">
-              <a:schemeClr val="accent1"/>
-            </a:effectRef>
-            <a:fontRef idx="minor">
-              <a:schemeClr val="tx1"/>
-            </a:fontRef>
-          </p:style>
-        </p:cxnSp>
-        <p:cxnSp>
-          <p:nvCxnSpPr>
-            <p:cNvPr id="65" name="Straight Arrow Connector 64"/>
-            <p:cNvCxnSpPr>
-              <a:stCxn id="9" idx="6"/>
-              <a:endCxn id="19" idx="2"/>
-            </p:cNvCxnSpPr>
-            <p:nvPr/>
-          </p:nvCxnSpPr>
-          <p:spPr>
-            <a:xfrm>
-              <a:off x="3735977" y="5267557"/>
-              <a:ext cx="1311730" cy="3213"/>
-            </a:xfrm>
-            <a:prstGeom prst="straightConnector1">
-              <a:avLst/>
-            </a:prstGeom>
-            <a:ln w="28575">
-              <a:solidFill>
-                <a:schemeClr val="tx1"/>
-              </a:solidFill>
-              <a:tailEnd type="triangle"/>
-            </a:ln>
-          </p:spPr>
-          <p:style>
-            <a:lnRef idx="1">
-              <a:schemeClr val="accent1"/>
-            </a:lnRef>
-            <a:fillRef idx="0">
-              <a:schemeClr val="accent1"/>
-            </a:fillRef>
-            <a:effectRef idx="0">
-              <a:schemeClr val="accent1"/>
-            </a:effectRef>
-            <a:fontRef idx="minor">
-              <a:schemeClr val="tx1"/>
-            </a:fontRef>
-          </p:style>
-        </p:cxnSp>
-        <p:cxnSp>
-          <p:nvCxnSpPr>
-            <p:cNvPr id="67" name="Straight Arrow Connector 66"/>
-            <p:cNvCxnSpPr>
-              <a:stCxn id="16" idx="6"/>
-              <a:endCxn id="23" idx="2"/>
-            </p:cNvCxnSpPr>
-            <p:nvPr/>
-          </p:nvCxnSpPr>
-          <p:spPr>
-            <a:xfrm>
-              <a:off x="5683433" y="2302274"/>
-              <a:ext cx="1208313" cy="1321208"/>
-            </a:xfrm>
-            <a:prstGeom prst="straightConnector1">
-              <a:avLst/>
-            </a:prstGeom>
-            <a:ln w="28575">
-              <a:solidFill>
-                <a:schemeClr val="tx1"/>
-              </a:solidFill>
-              <a:tailEnd type="triangle"/>
-            </a:ln>
-          </p:spPr>
-          <p:style>
-            <a:lnRef idx="1">
-              <a:schemeClr val="accent1"/>
-            </a:lnRef>
-            <a:fillRef idx="0">
-              <a:schemeClr val="accent1"/>
-            </a:fillRef>
-            <a:effectRef idx="0">
-              <a:schemeClr val="accent1"/>
-            </a:effectRef>
-            <a:fontRef idx="minor">
-              <a:schemeClr val="tx1"/>
-            </a:fontRef>
-          </p:style>
-        </p:cxnSp>
-        <p:cxnSp>
-          <p:nvCxnSpPr>
-            <p:cNvPr id="69" name="Straight Arrow Connector 68"/>
-            <p:cNvCxnSpPr>
-              <a:stCxn id="17" idx="6"/>
-              <a:endCxn id="23" idx="2"/>
-            </p:cNvCxnSpPr>
-            <p:nvPr/>
-          </p:nvCxnSpPr>
-          <p:spPr>
-            <a:xfrm>
-              <a:off x="5683433" y="3023959"/>
-              <a:ext cx="1208313" cy="599523"/>
-            </a:xfrm>
-            <a:prstGeom prst="straightConnector1">
-              <a:avLst/>
-            </a:prstGeom>
-            <a:ln w="28575">
-              <a:solidFill>
-                <a:schemeClr val="tx1"/>
-              </a:solidFill>
-              <a:tailEnd type="triangle"/>
-            </a:ln>
-          </p:spPr>
-          <p:style>
-            <a:lnRef idx="1">
-              <a:schemeClr val="accent1"/>
-            </a:lnRef>
-            <a:fillRef idx="0">
-              <a:schemeClr val="accent1"/>
-            </a:fillRef>
-            <a:effectRef idx="0">
-              <a:schemeClr val="accent1"/>
-            </a:effectRef>
-            <a:fontRef idx="minor">
-              <a:schemeClr val="tx1"/>
-            </a:fontRef>
-          </p:style>
-        </p:cxnSp>
-        <p:cxnSp>
-          <p:nvCxnSpPr>
-            <p:cNvPr id="71" name="Straight Arrow Connector 70"/>
-            <p:cNvCxnSpPr>
-              <a:stCxn id="18" idx="6"/>
-              <a:endCxn id="23" idx="2"/>
-            </p:cNvCxnSpPr>
-            <p:nvPr/>
-          </p:nvCxnSpPr>
-          <p:spPr>
-            <a:xfrm flipV="1">
-              <a:off x="5683433" y="3623482"/>
-              <a:ext cx="1208313" cy="867871"/>
-            </a:xfrm>
-            <a:prstGeom prst="straightConnector1">
-              <a:avLst/>
-            </a:prstGeom>
-            <a:ln w="28575">
-              <a:solidFill>
-                <a:schemeClr val="tx1"/>
-              </a:solidFill>
-              <a:tailEnd type="triangle"/>
-            </a:ln>
-          </p:spPr>
-          <p:style>
-            <a:lnRef idx="1">
-              <a:schemeClr val="accent1"/>
-            </a:lnRef>
-            <a:fillRef idx="0">
-              <a:schemeClr val="accent1"/>
-            </a:fillRef>
-            <a:effectRef idx="0">
-              <a:schemeClr val="accent1"/>
-            </a:effectRef>
-            <a:fontRef idx="minor">
-              <a:schemeClr val="tx1"/>
-            </a:fontRef>
-          </p:style>
-        </p:cxnSp>
-        <p:cxnSp>
-          <p:nvCxnSpPr>
-            <p:cNvPr id="73" name="Straight Arrow Connector 72"/>
-            <p:cNvCxnSpPr>
-              <a:stCxn id="19" idx="6"/>
-              <a:endCxn id="23" idx="2"/>
-            </p:cNvCxnSpPr>
-            <p:nvPr/>
-          </p:nvCxnSpPr>
-          <p:spPr>
-            <a:xfrm flipV="1">
-              <a:off x="5683433" y="3623482"/>
-              <a:ext cx="1208313" cy="1647288"/>
-            </a:xfrm>
-            <a:prstGeom prst="straightConnector1">
-              <a:avLst/>
-            </a:prstGeom>
-            <a:ln w="28575">
-              <a:solidFill>
-                <a:schemeClr val="tx1"/>
-              </a:solidFill>
-              <a:tailEnd type="triangle"/>
-            </a:ln>
-          </p:spPr>
-          <p:style>
-            <a:lnRef idx="1">
-              <a:schemeClr val="accent1"/>
-            </a:lnRef>
-            <a:fillRef idx="0">
-              <a:schemeClr val="accent1"/>
-            </a:fillRef>
-            <a:effectRef idx="0">
-              <a:schemeClr val="accent1"/>
-            </a:effectRef>
-            <a:fontRef idx="minor">
-              <a:schemeClr val="tx1"/>
-            </a:fontRef>
-          </p:style>
-        </p:cxnSp>
-        <p:grpSp>
-          <p:nvGrpSpPr>
-            <p:cNvPr id="80" name="Group 79"/>
-            <p:cNvGrpSpPr/>
-            <p:nvPr/>
-          </p:nvGrpSpPr>
-          <p:grpSpPr>
-            <a:xfrm>
-              <a:off x="8469128" y="3249926"/>
-              <a:ext cx="1484769" cy="723616"/>
-              <a:chOff x="8120957" y="3194587"/>
-              <a:chExt cx="1484769" cy="723616"/>
-            </a:xfrm>
-          </p:grpSpPr>
-          <p:sp>
-            <p:nvSpPr>
-              <p:cNvPr id="78" name="Rectangle 77"/>
-              <p:cNvSpPr/>
-              <p:nvPr/>
-            </p:nvSpPr>
-            <p:spPr>
-              <a:xfrm>
-                <a:off x="8120957" y="3194587"/>
-                <a:ext cx="1484769" cy="723616"/>
-              </a:xfrm>
-              <a:prstGeom prst="rect">
-                <a:avLst/>
-              </a:prstGeom>
-              <a:noFill/>
-              <a:ln w="57150">
-                <a:solidFill>
-                  <a:schemeClr val="tx1"/>
-                </a:solidFill>
-              </a:ln>
-            </p:spPr>
-            <p:style>
-              <a:lnRef idx="2">
-                <a:schemeClr val="accent1">
-                  <a:shade val="50000"/>
-                </a:schemeClr>
-              </a:lnRef>
-              <a:fillRef idx="1">
-                <a:schemeClr val="accent1"/>
-              </a:fillRef>
-              <a:effectRef idx="0">
-                <a:schemeClr val="accent1"/>
-              </a:effectRef>
-              <a:fontRef idx="minor">
-                <a:schemeClr val="lt1"/>
-              </a:fontRef>
-            </p:style>
-            <p:txBody>
-              <a:bodyPr rtlCol="0" anchor="ctr"/>
-              <a:lstStyle/>
-              <a:p>
-                <a:pPr algn="ctr"/>
-                <a:endParaRPr lang="en-CA"/>
-              </a:p>
-            </p:txBody>
-          </p:sp>
-          <p:sp>
-            <p:nvSpPr>
-              <p:cNvPr id="79" name="TextBox 78"/>
-              <p:cNvSpPr txBox="1"/>
-              <p:nvPr/>
-            </p:nvSpPr>
-            <p:spPr>
-              <a:xfrm>
-                <a:off x="8303079" y="3233229"/>
-                <a:ext cx="1138541" cy="646331"/>
-              </a:xfrm>
-              <a:prstGeom prst="rect">
-                <a:avLst/>
-              </a:prstGeom>
-              <a:noFill/>
-            </p:spPr>
-            <p:txBody>
-              <a:bodyPr wrap="square" rtlCol="0">
-                <a:spAutoFit/>
-              </a:bodyPr>
-              <a:lstStyle/>
-              <a:p>
-                <a:pPr algn="ctr"/>
-                <a:r>
-                  <a:rPr lang="en-CA" dirty="0" smtClean="0"/>
-                  <a:t>Multiply by 180</a:t>
-                </a:r>
-                <a:r>
-                  <a:rPr lang="en-CA" baseline="30000" dirty="0" smtClean="0"/>
-                  <a:t>o</a:t>
-                </a:r>
-                <a:endParaRPr lang="en-CA" dirty="0"/>
-              </a:p>
-            </p:txBody>
-          </p:sp>
-        </p:grpSp>
-        <p:cxnSp>
-          <p:nvCxnSpPr>
-            <p:cNvPr id="82" name="Straight Arrow Connector 81"/>
-            <p:cNvCxnSpPr>
-              <a:stCxn id="23" idx="6"/>
-              <a:endCxn id="78" idx="1"/>
-            </p:cNvCxnSpPr>
-            <p:nvPr/>
-          </p:nvCxnSpPr>
-          <p:spPr>
-            <a:xfrm flipV="1">
-              <a:off x="7745186" y="3611734"/>
-              <a:ext cx="723942" cy="11748"/>
+              <a:off x="8591924" y="3617284"/>
+              <a:ext cx="370124" cy="1"/>
             </a:xfrm>
             <a:prstGeom prst="straightConnector1">
               <a:avLst/>
@@ -13333,84 +13571,6 @@
             </a:fontRef>
           </p:style>
         </p:cxnSp>
-        <p:sp>
-          <p:nvSpPr>
-            <p:cNvPr id="83" name="Right Arrow 82"/>
-            <p:cNvSpPr/>
-            <p:nvPr/>
-          </p:nvSpPr>
-          <p:spPr>
-            <a:xfrm>
-              <a:off x="9953897" y="3313995"/>
-              <a:ext cx="1208313" cy="583474"/>
-            </a:xfrm>
-            <a:prstGeom prst="rightArrow">
-              <a:avLst/>
-            </a:prstGeom>
-            <a:solidFill>
-              <a:schemeClr val="tx1"/>
-            </a:solidFill>
-            <a:ln>
-              <a:solidFill>
-                <a:schemeClr val="tx1"/>
-              </a:solidFill>
-            </a:ln>
-          </p:spPr>
-          <p:style>
-            <a:lnRef idx="2">
-              <a:schemeClr val="accent1">
-                <a:shade val="50000"/>
-              </a:schemeClr>
-            </a:lnRef>
-            <a:fillRef idx="1">
-              <a:schemeClr val="accent1"/>
-            </a:fillRef>
-            <a:effectRef idx="0">
-              <a:schemeClr val="accent1"/>
-            </a:effectRef>
-            <a:fontRef idx="minor">
-              <a:schemeClr val="lt1"/>
-            </a:fontRef>
-          </p:style>
-          <p:txBody>
-            <a:bodyPr rtlCol="0" anchor="ctr"/>
-            <a:lstStyle/>
-            <a:p>
-              <a:pPr algn="ctr"/>
-              <a:endParaRPr lang="en-CA"/>
-            </a:p>
-          </p:txBody>
-        </p:sp>
-        <p:sp>
-          <p:nvSpPr>
-            <p:cNvPr id="84" name="TextBox 83"/>
-            <p:cNvSpPr txBox="1"/>
-            <p:nvPr/>
-          </p:nvSpPr>
-          <p:spPr>
-            <a:xfrm>
-              <a:off x="9953897" y="2457571"/>
-              <a:ext cx="1426309" cy="830997"/>
-            </a:xfrm>
-            <a:prstGeom prst="rect">
-              <a:avLst/>
-            </a:prstGeom>
-            <a:noFill/>
-          </p:spPr>
-          <p:txBody>
-            <a:bodyPr wrap="square" rtlCol="0">
-              <a:spAutoFit/>
-            </a:bodyPr>
-            <a:lstStyle/>
-            <a:p>
-              <a:r>
-                <a:rPr lang="en-CA" sz="2400" dirty="0" smtClean="0"/>
-                <a:t>Curvature estimate</a:t>
-              </a:r>
-              <a:endParaRPr lang="en-CA" sz="2400" dirty="0"/>
-            </a:p>
-          </p:txBody>
-        </p:sp>
       </p:grpSp>
     </p:spTree>
     <p:extLst>

</xml_diff>